<commit_message>
19/01/2015 9:21 Signed-off-by: cyrexxx <kartik@kth.se>
</commit_message>
<xml_diff>
--- a/pictures_EXjob.pptx
+++ b/pictures_EXjob.pptx
@@ -10,6 +10,8 @@
     <p:sldId id="258" r:id="rId4"/>
     <p:sldId id="259" r:id="rId5"/>
     <p:sldId id="260" r:id="rId6"/>
+    <p:sldId id="261" r:id="rId7"/>
+    <p:sldId id="262" r:id="rId8"/>
   </p:sldIdLst>
   <p:sldSz cx="9144000" cy="6858000" type="screen4x3"/>
   <p:notesSz cx="6858000" cy="9144000"/>
@@ -292,7 +294,7 @@
           <a:p>
             <a:fld id="{BE16429E-4863-48F2-B7AC-2A1E05C3D89A}" type="datetimeFigureOut">
               <a:rPr lang="en-GB" smtClean="0"/>
-              <a:t>23/10/2014</a:t>
+              <a:t>15/01/2015</a:t>
             </a:fld>
             <a:endParaRPr lang="en-GB" dirty="0"/>
           </a:p>
@@ -462,7 +464,7 @@
           <a:p>
             <a:fld id="{BE16429E-4863-48F2-B7AC-2A1E05C3D89A}" type="datetimeFigureOut">
               <a:rPr lang="en-GB" smtClean="0"/>
-              <a:t>23/10/2014</a:t>
+              <a:t>15/01/2015</a:t>
             </a:fld>
             <a:endParaRPr lang="en-GB" dirty="0"/>
           </a:p>
@@ -642,7 +644,7 @@
           <a:p>
             <a:fld id="{BE16429E-4863-48F2-B7AC-2A1E05C3D89A}" type="datetimeFigureOut">
               <a:rPr lang="en-GB" smtClean="0"/>
-              <a:t>23/10/2014</a:t>
+              <a:t>15/01/2015</a:t>
             </a:fld>
             <a:endParaRPr lang="en-GB" dirty="0"/>
           </a:p>
@@ -812,7 +814,7 @@
           <a:p>
             <a:fld id="{BE16429E-4863-48F2-B7AC-2A1E05C3D89A}" type="datetimeFigureOut">
               <a:rPr lang="en-GB" smtClean="0"/>
-              <a:t>23/10/2014</a:t>
+              <a:t>15/01/2015</a:t>
             </a:fld>
             <a:endParaRPr lang="en-GB" dirty="0"/>
           </a:p>
@@ -1058,7 +1060,7 @@
           <a:p>
             <a:fld id="{BE16429E-4863-48F2-B7AC-2A1E05C3D89A}" type="datetimeFigureOut">
               <a:rPr lang="en-GB" smtClean="0"/>
-              <a:t>23/10/2014</a:t>
+              <a:t>15/01/2015</a:t>
             </a:fld>
             <a:endParaRPr lang="en-GB" dirty="0"/>
           </a:p>
@@ -1346,7 +1348,7 @@
           <a:p>
             <a:fld id="{BE16429E-4863-48F2-B7AC-2A1E05C3D89A}" type="datetimeFigureOut">
               <a:rPr lang="en-GB" smtClean="0"/>
-              <a:t>23/10/2014</a:t>
+              <a:t>15/01/2015</a:t>
             </a:fld>
             <a:endParaRPr lang="en-GB" dirty="0"/>
           </a:p>
@@ -1768,7 +1770,7 @@
           <a:p>
             <a:fld id="{BE16429E-4863-48F2-B7AC-2A1E05C3D89A}" type="datetimeFigureOut">
               <a:rPr lang="en-GB" smtClean="0"/>
-              <a:t>23/10/2014</a:t>
+              <a:t>15/01/2015</a:t>
             </a:fld>
             <a:endParaRPr lang="en-GB" dirty="0"/>
           </a:p>
@@ -1886,7 +1888,7 @@
           <a:p>
             <a:fld id="{BE16429E-4863-48F2-B7AC-2A1E05C3D89A}" type="datetimeFigureOut">
               <a:rPr lang="en-GB" smtClean="0"/>
-              <a:t>23/10/2014</a:t>
+              <a:t>15/01/2015</a:t>
             </a:fld>
             <a:endParaRPr lang="en-GB" dirty="0"/>
           </a:p>
@@ -1981,7 +1983,7 @@
           <a:p>
             <a:fld id="{BE16429E-4863-48F2-B7AC-2A1E05C3D89A}" type="datetimeFigureOut">
               <a:rPr lang="en-GB" smtClean="0"/>
-              <a:t>23/10/2014</a:t>
+              <a:t>15/01/2015</a:t>
             </a:fld>
             <a:endParaRPr lang="en-GB" dirty="0"/>
           </a:p>
@@ -2258,7 +2260,7 @@
           <a:p>
             <a:fld id="{BE16429E-4863-48F2-B7AC-2A1E05C3D89A}" type="datetimeFigureOut">
               <a:rPr lang="en-GB" smtClean="0"/>
-              <a:t>23/10/2014</a:t>
+              <a:t>15/01/2015</a:t>
             </a:fld>
             <a:endParaRPr lang="en-GB" dirty="0"/>
           </a:p>
@@ -2511,7 +2513,7 @@
           <a:p>
             <a:fld id="{BE16429E-4863-48F2-B7AC-2A1E05C3D89A}" type="datetimeFigureOut">
               <a:rPr lang="en-GB" smtClean="0"/>
-              <a:t>23/10/2014</a:t>
+              <a:t>15/01/2015</a:t>
             </a:fld>
             <a:endParaRPr lang="en-GB" dirty="0"/>
           </a:p>
@@ -2724,7 +2726,7 @@
           <a:p>
             <a:fld id="{BE16429E-4863-48F2-B7AC-2A1E05C3D89A}" type="datetimeFigureOut">
               <a:rPr lang="en-GB" smtClean="0"/>
-              <a:t>23/10/2014</a:t>
+              <a:t>15/01/2015</a:t>
             </a:fld>
             <a:endParaRPr lang="en-GB" dirty="0"/>
           </a:p>
@@ -18705,6 +18707,3895 @@
 </p:sld>
 </file>
 
+<file path=ppt/slides/slide6.xml><?xml version="1.0" encoding="utf-8"?>
+<p:sld xmlns:a="http://schemas.openxmlformats.org/drawingml/2006/main" xmlns:r="http://schemas.openxmlformats.org/officeDocument/2006/relationships" xmlns:p="http://schemas.openxmlformats.org/presentationml/2006/main">
+  <p:cSld>
+    <p:spTree>
+      <p:nvGrpSpPr>
+        <p:cNvPr id="1" name=""/>
+        <p:cNvGrpSpPr/>
+        <p:nvPr/>
+      </p:nvGrpSpPr>
+      <p:grpSpPr>
+        <a:xfrm>
+          <a:off x="0" y="0"/>
+          <a:ext cx="0" cy="0"/>
+          <a:chOff x="0" y="0"/>
+          <a:chExt cx="0" cy="0"/>
+        </a:xfrm>
+      </p:grpSpPr>
+      <p:cxnSp>
+        <p:nvCxnSpPr>
+          <p:cNvPr id="52" name="Straight Connector 51"/>
+          <p:cNvCxnSpPr/>
+          <p:nvPr/>
+        </p:nvCxnSpPr>
+        <p:spPr>
+          <a:xfrm flipV="1">
+            <a:off x="4407203" y="511483"/>
+            <a:ext cx="0" cy="2603541"/>
+          </a:xfrm>
+          <a:prstGeom prst="line">
+            <a:avLst/>
+          </a:prstGeom>
+          <a:effectLst/>
+        </p:spPr>
+        <p:style>
+          <a:lnRef idx="2">
+            <a:schemeClr val="accent2"/>
+          </a:lnRef>
+          <a:fillRef idx="0">
+            <a:schemeClr val="accent2"/>
+          </a:fillRef>
+          <a:effectRef idx="1">
+            <a:schemeClr val="accent2"/>
+          </a:effectRef>
+          <a:fontRef idx="minor">
+            <a:schemeClr val="tx1"/>
+          </a:fontRef>
+        </p:style>
+      </p:cxnSp>
+      <p:cxnSp>
+        <p:nvCxnSpPr>
+          <p:cNvPr id="13" name="Straight Arrow Connector 12"/>
+          <p:cNvCxnSpPr/>
+          <p:nvPr/>
+        </p:nvCxnSpPr>
+        <p:spPr>
+          <a:xfrm flipV="1">
+            <a:off x="2627784" y="380678"/>
+            <a:ext cx="0" cy="2736304"/>
+          </a:xfrm>
+          <a:prstGeom prst="straightConnector1">
+            <a:avLst/>
+          </a:prstGeom>
+          <a:ln>
+            <a:tailEnd type="arrow"/>
+          </a:ln>
+          <a:effectLst/>
+        </p:spPr>
+        <p:style>
+          <a:lnRef idx="2">
+            <a:schemeClr val="dk1"/>
+          </a:lnRef>
+          <a:fillRef idx="0">
+            <a:schemeClr val="dk1"/>
+          </a:fillRef>
+          <a:effectRef idx="1">
+            <a:schemeClr val="dk1"/>
+          </a:effectRef>
+          <a:fontRef idx="minor">
+            <a:schemeClr val="tx1"/>
+          </a:fontRef>
+        </p:style>
+      </p:cxnSp>
+      <p:cxnSp>
+        <p:nvCxnSpPr>
+          <p:cNvPr id="18" name="Straight Connector 17"/>
+          <p:cNvCxnSpPr/>
+          <p:nvPr/>
+        </p:nvCxnSpPr>
+        <p:spPr>
+          <a:xfrm>
+            <a:off x="3059832" y="740718"/>
+            <a:ext cx="0" cy="2376264"/>
+          </a:xfrm>
+          <a:prstGeom prst="line">
+            <a:avLst/>
+          </a:prstGeom>
+          <a:ln>
+            <a:solidFill>
+              <a:schemeClr val="accent1"/>
+            </a:solidFill>
+          </a:ln>
+          <a:effectLst/>
+        </p:spPr>
+        <p:style>
+          <a:lnRef idx="2">
+            <a:schemeClr val="accent5"/>
+          </a:lnRef>
+          <a:fillRef idx="0">
+            <a:schemeClr val="accent5"/>
+          </a:fillRef>
+          <a:effectRef idx="1">
+            <a:schemeClr val="accent5"/>
+          </a:effectRef>
+          <a:fontRef idx="minor">
+            <a:schemeClr val="tx1"/>
+          </a:fontRef>
+        </p:style>
+      </p:cxnSp>
+      <p:cxnSp>
+        <p:nvCxnSpPr>
+          <p:cNvPr id="19" name="Straight Connector 18"/>
+          <p:cNvCxnSpPr/>
+          <p:nvPr/>
+        </p:nvCxnSpPr>
+        <p:spPr>
+          <a:xfrm>
+            <a:off x="6558153" y="1676822"/>
+            <a:ext cx="0" cy="1445231"/>
+          </a:xfrm>
+          <a:prstGeom prst="line">
+            <a:avLst/>
+          </a:prstGeom>
+          <a:ln>
+            <a:solidFill>
+              <a:schemeClr val="accent1"/>
+            </a:solidFill>
+          </a:ln>
+          <a:effectLst/>
+        </p:spPr>
+        <p:style>
+          <a:lnRef idx="2">
+            <a:schemeClr val="accent5"/>
+          </a:lnRef>
+          <a:fillRef idx="0">
+            <a:schemeClr val="accent5"/>
+          </a:fillRef>
+          <a:effectRef idx="1">
+            <a:schemeClr val="accent5"/>
+          </a:effectRef>
+          <a:fontRef idx="minor">
+            <a:schemeClr val="tx1"/>
+          </a:fontRef>
+        </p:style>
+      </p:cxnSp>
+      <p:sp>
+        <p:nvSpPr>
+          <p:cNvPr id="26" name="TextBox 25"/>
+          <p:cNvSpPr txBox="1"/>
+          <p:nvPr/>
+        </p:nvSpPr>
+        <p:spPr>
+          <a:xfrm>
+            <a:off x="2906487" y="3115024"/>
+            <a:ext cx="216024" cy="369332"/>
+          </a:xfrm>
+          <a:prstGeom prst="rect">
+            <a:avLst/>
+          </a:prstGeom>
+          <a:noFill/>
+        </p:spPr>
+        <p:txBody>
+          <a:bodyPr wrap="square" rtlCol="0">
+            <a:spAutoFit/>
+          </a:bodyPr>
+          <a:lstStyle/>
+          <a:p>
+            <a:r>
+              <a:rPr lang="en-US" i="1" dirty="0" smtClean="0"/>
+              <a:t>a</a:t>
+            </a:r>
+            <a:endParaRPr lang="en-GB" i="1" dirty="0"/>
+          </a:p>
+        </p:txBody>
+      </p:sp>
+      <p:sp>
+        <p:nvSpPr>
+          <p:cNvPr id="30" name="Rectangle 29"/>
+          <p:cNvSpPr/>
+          <p:nvPr/>
+        </p:nvSpPr>
+        <p:spPr>
+          <a:xfrm>
+            <a:off x="6406509" y="3115024"/>
+            <a:ext cx="303288" cy="369332"/>
+          </a:xfrm>
+          <a:prstGeom prst="rect">
+            <a:avLst/>
+          </a:prstGeom>
+        </p:spPr>
+        <p:txBody>
+          <a:bodyPr wrap="none">
+            <a:spAutoFit/>
+          </a:bodyPr>
+          <a:lstStyle/>
+          <a:p>
+            <a:r>
+              <a:rPr lang="en-US" i="1" dirty="0"/>
+              <a:t>b</a:t>
+            </a:r>
+            <a:endParaRPr lang="en-GB" i="1" dirty="0"/>
+          </a:p>
+        </p:txBody>
+      </p:sp>
+      <p:sp>
+        <p:nvSpPr>
+          <p:cNvPr id="31" name="Rectangle 30"/>
+          <p:cNvSpPr/>
+          <p:nvPr/>
+        </p:nvSpPr>
+        <p:spPr>
+          <a:xfrm>
+            <a:off x="2846472" y="203706"/>
+            <a:ext cx="426720" cy="307777"/>
+          </a:xfrm>
+          <a:prstGeom prst="rect">
+            <a:avLst/>
+          </a:prstGeom>
+        </p:spPr>
+        <p:txBody>
+          <a:bodyPr wrap="none">
+            <a:spAutoFit/>
+          </a:bodyPr>
+          <a:lstStyle/>
+          <a:p>
+            <a:r>
+              <a:rPr lang="en-US" sz="1400" i="1" dirty="0"/>
+              <a:t>f</a:t>
+            </a:r>
+            <a:r>
+              <a:rPr lang="en-US" sz="1400" i="1" dirty="0" smtClean="0"/>
+              <a:t>(x)</a:t>
+            </a:r>
+            <a:endParaRPr lang="en-GB" sz="1400" i="1" dirty="0"/>
+          </a:p>
+        </p:txBody>
+      </p:sp>
+      <p:sp>
+        <p:nvSpPr>
+          <p:cNvPr id="32" name="Rectangle 31"/>
+          <p:cNvSpPr/>
+          <p:nvPr/>
+        </p:nvSpPr>
+        <p:spPr>
+          <a:xfrm>
+            <a:off x="2379809" y="380678"/>
+            <a:ext cx="245580" cy="261610"/>
+          </a:xfrm>
+          <a:prstGeom prst="rect">
+            <a:avLst/>
+          </a:prstGeom>
+        </p:spPr>
+        <p:txBody>
+          <a:bodyPr wrap="none">
+            <a:spAutoFit/>
+          </a:bodyPr>
+          <a:lstStyle/>
+          <a:p>
+            <a:r>
+              <a:rPr lang="en-US" sz="1100" i="1" dirty="0" smtClean="0"/>
+              <a:t>y</a:t>
+            </a:r>
+            <a:endParaRPr lang="en-GB" i="1" dirty="0"/>
+          </a:p>
+        </p:txBody>
+      </p:sp>
+      <p:sp>
+        <p:nvSpPr>
+          <p:cNvPr id="35" name="Rectangle 34"/>
+          <p:cNvSpPr/>
+          <p:nvPr/>
+        </p:nvSpPr>
+        <p:spPr>
+          <a:xfrm>
+            <a:off x="6990716" y="3115295"/>
+            <a:ext cx="245580" cy="261610"/>
+          </a:xfrm>
+          <a:prstGeom prst="rect">
+            <a:avLst/>
+          </a:prstGeom>
+        </p:spPr>
+        <p:txBody>
+          <a:bodyPr wrap="none">
+            <a:spAutoFit/>
+          </a:bodyPr>
+          <a:lstStyle/>
+          <a:p>
+            <a:r>
+              <a:rPr lang="en-US" sz="1100" i="1" dirty="0" smtClean="0"/>
+              <a:t>x</a:t>
+            </a:r>
+            <a:endParaRPr lang="en-GB" i="1" dirty="0"/>
+          </a:p>
+        </p:txBody>
+      </p:sp>
+      <p:cxnSp>
+        <p:nvCxnSpPr>
+          <p:cNvPr id="37" name="Straight Connector 36"/>
+          <p:cNvCxnSpPr/>
+          <p:nvPr/>
+        </p:nvCxnSpPr>
+        <p:spPr>
+          <a:xfrm>
+            <a:off x="2625389" y="3594617"/>
+            <a:ext cx="4610907" cy="0"/>
+          </a:xfrm>
+          <a:prstGeom prst="line">
+            <a:avLst/>
+          </a:prstGeom>
+        </p:spPr>
+        <p:style>
+          <a:lnRef idx="1">
+            <a:schemeClr val="dk1"/>
+          </a:lnRef>
+          <a:fillRef idx="0">
+            <a:schemeClr val="dk1"/>
+          </a:fillRef>
+          <a:effectRef idx="0">
+            <a:schemeClr val="dk1"/>
+          </a:effectRef>
+          <a:fontRef idx="minor">
+            <a:schemeClr val="tx1"/>
+          </a:fontRef>
+        </p:style>
+      </p:cxnSp>
+      <p:cxnSp>
+        <p:nvCxnSpPr>
+          <p:cNvPr id="41" name="Straight Connector 40"/>
+          <p:cNvCxnSpPr/>
+          <p:nvPr/>
+        </p:nvCxnSpPr>
+        <p:spPr>
+          <a:xfrm flipV="1">
+            <a:off x="3059832" y="3486161"/>
+            <a:ext cx="0" cy="216024"/>
+          </a:xfrm>
+          <a:prstGeom prst="line">
+            <a:avLst/>
+          </a:prstGeom>
+          <a:ln>
+            <a:solidFill>
+              <a:schemeClr val="accent1"/>
+            </a:solidFill>
+          </a:ln>
+          <a:effectLst/>
+        </p:spPr>
+        <p:style>
+          <a:lnRef idx="2">
+            <a:schemeClr val="accent5"/>
+          </a:lnRef>
+          <a:fillRef idx="0">
+            <a:schemeClr val="accent5"/>
+          </a:fillRef>
+          <a:effectRef idx="1">
+            <a:schemeClr val="accent5"/>
+          </a:effectRef>
+          <a:fontRef idx="minor">
+            <a:schemeClr val="tx1"/>
+          </a:fontRef>
+        </p:style>
+      </p:cxnSp>
+      <p:cxnSp>
+        <p:nvCxnSpPr>
+          <p:cNvPr id="47" name="Straight Connector 46"/>
+          <p:cNvCxnSpPr/>
+          <p:nvPr/>
+        </p:nvCxnSpPr>
+        <p:spPr>
+          <a:xfrm flipV="1">
+            <a:off x="6556856" y="3485202"/>
+            <a:ext cx="0" cy="216024"/>
+          </a:xfrm>
+          <a:prstGeom prst="line">
+            <a:avLst/>
+          </a:prstGeom>
+          <a:ln>
+            <a:solidFill>
+              <a:schemeClr val="accent1"/>
+            </a:solidFill>
+          </a:ln>
+          <a:effectLst/>
+        </p:spPr>
+        <p:style>
+          <a:lnRef idx="2">
+            <a:schemeClr val="accent5"/>
+          </a:lnRef>
+          <a:fillRef idx="0">
+            <a:schemeClr val="accent5"/>
+          </a:fillRef>
+          <a:effectRef idx="1">
+            <a:schemeClr val="accent5"/>
+          </a:effectRef>
+          <a:fontRef idx="minor">
+            <a:schemeClr val="tx1"/>
+          </a:fontRef>
+        </p:style>
+      </p:cxnSp>
+      <p:cxnSp>
+        <p:nvCxnSpPr>
+          <p:cNvPr id="48" name="Straight Connector 47"/>
+          <p:cNvCxnSpPr/>
+          <p:nvPr/>
+        </p:nvCxnSpPr>
+        <p:spPr>
+          <a:xfrm flipV="1">
+            <a:off x="4407203" y="3485236"/>
+            <a:ext cx="0" cy="216024"/>
+          </a:xfrm>
+          <a:prstGeom prst="line">
+            <a:avLst/>
+          </a:prstGeom>
+          <a:effectLst/>
+        </p:spPr>
+        <p:style>
+          <a:lnRef idx="2">
+            <a:schemeClr val="accent2"/>
+          </a:lnRef>
+          <a:fillRef idx="0">
+            <a:schemeClr val="accent2"/>
+          </a:fillRef>
+          <a:effectRef idx="1">
+            <a:schemeClr val="accent2"/>
+          </a:effectRef>
+          <a:fontRef idx="minor">
+            <a:schemeClr val="tx1"/>
+          </a:fontRef>
+        </p:style>
+      </p:cxnSp>
+      <p:cxnSp>
+        <p:nvCxnSpPr>
+          <p:cNvPr id="55" name="Straight Connector 54"/>
+          <p:cNvCxnSpPr/>
+          <p:nvPr/>
+        </p:nvCxnSpPr>
+        <p:spPr>
+          <a:xfrm flipV="1">
+            <a:off x="5233926" y="949815"/>
+            <a:ext cx="0" cy="2164568"/>
+          </a:xfrm>
+          <a:prstGeom prst="line">
+            <a:avLst/>
+          </a:prstGeom>
+          <a:effectLst/>
+        </p:spPr>
+        <p:style>
+          <a:lnRef idx="2">
+            <a:schemeClr val="accent2"/>
+          </a:lnRef>
+          <a:fillRef idx="0">
+            <a:schemeClr val="accent2"/>
+          </a:fillRef>
+          <a:effectRef idx="1">
+            <a:schemeClr val="accent2"/>
+          </a:effectRef>
+          <a:fontRef idx="minor">
+            <a:schemeClr val="tx1"/>
+          </a:fontRef>
+        </p:style>
+      </p:cxnSp>
+      <p:cxnSp>
+        <p:nvCxnSpPr>
+          <p:cNvPr id="49" name="Straight Connector 48"/>
+          <p:cNvCxnSpPr/>
+          <p:nvPr/>
+        </p:nvCxnSpPr>
+        <p:spPr>
+          <a:xfrm flipV="1">
+            <a:off x="5226999" y="3481047"/>
+            <a:ext cx="0" cy="216024"/>
+          </a:xfrm>
+          <a:prstGeom prst="line">
+            <a:avLst/>
+          </a:prstGeom>
+          <a:effectLst/>
+        </p:spPr>
+        <p:style>
+          <a:lnRef idx="2">
+            <a:schemeClr val="accent2"/>
+          </a:lnRef>
+          <a:fillRef idx="0">
+            <a:schemeClr val="accent2"/>
+          </a:fillRef>
+          <a:effectRef idx="1">
+            <a:schemeClr val="accent2"/>
+          </a:effectRef>
+          <a:fontRef idx="minor">
+            <a:schemeClr val="tx1"/>
+          </a:fontRef>
+        </p:style>
+      </p:cxnSp>
+      <p:sp>
+        <p:nvSpPr>
+          <p:cNvPr id="59" name="TextBox 58"/>
+          <p:cNvSpPr txBox="1"/>
+          <p:nvPr/>
+        </p:nvSpPr>
+        <p:spPr>
+          <a:xfrm>
+            <a:off x="4191179" y="3115024"/>
+            <a:ext cx="432048" cy="369332"/>
+          </a:xfrm>
+          <a:prstGeom prst="rect">
+            <a:avLst/>
+          </a:prstGeom>
+          <a:noFill/>
+        </p:spPr>
+        <p:txBody>
+          <a:bodyPr wrap="square" rtlCol="0">
+            <a:spAutoFit/>
+          </a:bodyPr>
+          <a:lstStyle/>
+          <a:p>
+            <a:r>
+              <a:rPr lang="en-US" i="1" dirty="0" smtClean="0"/>
+              <a:t>p</a:t>
+            </a:r>
+            <a:r>
+              <a:rPr lang="en-US" i="1" baseline="-25000" dirty="0" smtClean="0"/>
+              <a:t>1</a:t>
+            </a:r>
+            <a:endParaRPr lang="en-GB" i="1" baseline="-25000" dirty="0"/>
+          </a:p>
+        </p:txBody>
+      </p:sp>
+      <p:sp>
+        <p:nvSpPr>
+          <p:cNvPr id="61" name="TextBox 60"/>
+          <p:cNvSpPr txBox="1"/>
+          <p:nvPr/>
+        </p:nvSpPr>
+        <p:spPr>
+          <a:xfrm>
+            <a:off x="5017902" y="3115295"/>
+            <a:ext cx="432048" cy="369332"/>
+          </a:xfrm>
+          <a:prstGeom prst="rect">
+            <a:avLst/>
+          </a:prstGeom>
+          <a:noFill/>
+        </p:spPr>
+        <p:txBody>
+          <a:bodyPr wrap="square" rtlCol="0">
+            <a:spAutoFit/>
+          </a:bodyPr>
+          <a:lstStyle/>
+          <a:p>
+            <a:r>
+              <a:rPr lang="en-US" i="1" dirty="0" smtClean="0"/>
+              <a:t>p</a:t>
+            </a:r>
+            <a:r>
+              <a:rPr lang="en-US" i="1" baseline="-25000" dirty="0" smtClean="0"/>
+              <a:t>2</a:t>
+            </a:r>
+            <a:endParaRPr lang="en-GB" i="1" baseline="-25000" dirty="0"/>
+          </a:p>
+        </p:txBody>
+      </p:sp>
+      <p:cxnSp>
+        <p:nvCxnSpPr>
+          <p:cNvPr id="64" name="Straight Arrow Connector 63"/>
+          <p:cNvCxnSpPr/>
+          <p:nvPr/>
+        </p:nvCxnSpPr>
+        <p:spPr>
+          <a:xfrm>
+            <a:off x="3059832" y="3949017"/>
+            <a:ext cx="1347371" cy="0"/>
+          </a:xfrm>
+          <a:prstGeom prst="straightConnector1">
+            <a:avLst/>
+          </a:prstGeom>
+          <a:ln>
+            <a:headEnd type="arrow"/>
+            <a:tailEnd type="arrow"/>
+          </a:ln>
+        </p:spPr>
+        <p:style>
+          <a:lnRef idx="1">
+            <a:schemeClr val="dk1"/>
+          </a:lnRef>
+          <a:fillRef idx="0">
+            <a:schemeClr val="dk1"/>
+          </a:fillRef>
+          <a:effectRef idx="0">
+            <a:schemeClr val="dk1"/>
+          </a:effectRef>
+          <a:fontRef idx="minor">
+            <a:schemeClr val="tx1"/>
+          </a:fontRef>
+        </p:style>
+      </p:cxnSp>
+      <p:cxnSp>
+        <p:nvCxnSpPr>
+          <p:cNvPr id="66" name="Straight Arrow Connector 65"/>
+          <p:cNvCxnSpPr/>
+          <p:nvPr/>
+        </p:nvCxnSpPr>
+        <p:spPr>
+          <a:xfrm>
+            <a:off x="3059832" y="4170681"/>
+            <a:ext cx="2167167" cy="0"/>
+          </a:xfrm>
+          <a:prstGeom prst="straightConnector1">
+            <a:avLst/>
+          </a:prstGeom>
+          <a:ln>
+            <a:headEnd type="arrow"/>
+            <a:tailEnd type="arrow"/>
+          </a:ln>
+        </p:spPr>
+        <p:style>
+          <a:lnRef idx="1">
+            <a:schemeClr val="dk1"/>
+          </a:lnRef>
+          <a:fillRef idx="0">
+            <a:schemeClr val="dk1"/>
+          </a:fillRef>
+          <a:effectRef idx="0">
+            <a:schemeClr val="dk1"/>
+          </a:effectRef>
+          <a:fontRef idx="minor">
+            <a:schemeClr val="tx1"/>
+          </a:fontRef>
+        </p:style>
+      </p:cxnSp>
+      <p:cxnSp>
+        <p:nvCxnSpPr>
+          <p:cNvPr id="69" name="Straight Arrow Connector 68"/>
+          <p:cNvCxnSpPr/>
+          <p:nvPr/>
+        </p:nvCxnSpPr>
+        <p:spPr>
+          <a:xfrm>
+            <a:off x="5226999" y="4170517"/>
+            <a:ext cx="1347371" cy="0"/>
+          </a:xfrm>
+          <a:prstGeom prst="straightConnector1">
+            <a:avLst/>
+          </a:prstGeom>
+          <a:ln>
+            <a:headEnd type="arrow"/>
+            <a:tailEnd type="arrow"/>
+          </a:ln>
+        </p:spPr>
+        <p:style>
+          <a:lnRef idx="1">
+            <a:schemeClr val="dk1"/>
+          </a:lnRef>
+          <a:fillRef idx="0">
+            <a:schemeClr val="dk1"/>
+          </a:fillRef>
+          <a:effectRef idx="0">
+            <a:schemeClr val="dk1"/>
+          </a:effectRef>
+          <a:fontRef idx="minor">
+            <a:schemeClr val="tx1"/>
+          </a:fontRef>
+        </p:style>
+      </p:cxnSp>
+      <p:cxnSp>
+        <p:nvCxnSpPr>
+          <p:cNvPr id="70" name="Straight Arrow Connector 69"/>
+          <p:cNvCxnSpPr/>
+          <p:nvPr/>
+        </p:nvCxnSpPr>
+        <p:spPr>
+          <a:xfrm>
+            <a:off x="4407780" y="3949023"/>
+            <a:ext cx="2167167" cy="0"/>
+          </a:xfrm>
+          <a:prstGeom prst="straightConnector1">
+            <a:avLst/>
+          </a:prstGeom>
+          <a:ln>
+            <a:headEnd type="arrow"/>
+            <a:tailEnd type="arrow"/>
+          </a:ln>
+        </p:spPr>
+        <p:style>
+          <a:lnRef idx="1">
+            <a:schemeClr val="dk1"/>
+          </a:lnRef>
+          <a:fillRef idx="0">
+            <a:schemeClr val="dk1"/>
+          </a:fillRef>
+          <a:effectRef idx="0">
+            <a:schemeClr val="dk1"/>
+          </a:effectRef>
+          <a:fontRef idx="minor">
+            <a:schemeClr val="tx1"/>
+          </a:fontRef>
+        </p:style>
+      </p:cxnSp>
+      <p:sp>
+        <p:nvSpPr>
+          <p:cNvPr id="72" name="TextBox 71"/>
+          <p:cNvSpPr txBox="1"/>
+          <p:nvPr/>
+        </p:nvSpPr>
+        <p:spPr>
+          <a:xfrm>
+            <a:off x="3620309" y="3738633"/>
+            <a:ext cx="226415" cy="261610"/>
+          </a:xfrm>
+          <a:prstGeom prst="rect">
+            <a:avLst/>
+          </a:prstGeom>
+          <a:noFill/>
+        </p:spPr>
+        <p:txBody>
+          <a:bodyPr wrap="square" rtlCol="0">
+            <a:spAutoFit/>
+          </a:bodyPr>
+          <a:lstStyle/>
+          <a:p>
+            <a:r>
+              <a:rPr lang="el-GR" sz="1050" dirty="0" smtClean="0"/>
+              <a:t>α</a:t>
+            </a:r>
+            <a:endParaRPr lang="en-GB" sz="1050" dirty="0"/>
+          </a:p>
+        </p:txBody>
+      </p:sp>
+      <p:sp>
+        <p:nvSpPr>
+          <p:cNvPr id="74" name="TextBox 73"/>
+          <p:cNvSpPr txBox="1"/>
+          <p:nvPr/>
+        </p:nvSpPr>
+        <p:spPr>
+          <a:xfrm>
+            <a:off x="5787476" y="3959478"/>
+            <a:ext cx="226415" cy="261610"/>
+          </a:xfrm>
+          <a:prstGeom prst="rect">
+            <a:avLst/>
+          </a:prstGeom>
+          <a:noFill/>
+        </p:spPr>
+        <p:txBody>
+          <a:bodyPr wrap="square" rtlCol="0">
+            <a:spAutoFit/>
+          </a:bodyPr>
+          <a:lstStyle/>
+          <a:p>
+            <a:r>
+              <a:rPr lang="el-GR" sz="1050" dirty="0" smtClean="0"/>
+              <a:t>α</a:t>
+            </a:r>
+            <a:endParaRPr lang="en-GB" sz="1050" dirty="0"/>
+          </a:p>
+        </p:txBody>
+      </p:sp>
+      <p:cxnSp>
+        <p:nvCxnSpPr>
+          <p:cNvPr id="3" name="Straight Connector 2"/>
+          <p:cNvCxnSpPr/>
+          <p:nvPr/>
+        </p:nvCxnSpPr>
+        <p:spPr>
+          <a:xfrm>
+            <a:off x="3635896" y="304645"/>
+            <a:ext cx="0" cy="2809738"/>
+          </a:xfrm>
+          <a:prstGeom prst="line">
+            <a:avLst/>
+          </a:prstGeom>
+          <a:ln/>
+          <a:effectLst/>
+        </p:spPr>
+        <p:style>
+          <a:lnRef idx="2">
+            <a:schemeClr val="accent4"/>
+          </a:lnRef>
+          <a:fillRef idx="0">
+            <a:schemeClr val="accent4"/>
+          </a:fillRef>
+          <a:effectRef idx="1">
+            <a:schemeClr val="accent4"/>
+          </a:effectRef>
+          <a:fontRef idx="minor">
+            <a:schemeClr val="tx1"/>
+          </a:fontRef>
+        </p:style>
+      </p:cxnSp>
+      <p:sp>
+        <p:nvSpPr>
+          <p:cNvPr id="75" name="TextBox 74"/>
+          <p:cNvSpPr txBox="1"/>
+          <p:nvPr/>
+        </p:nvSpPr>
+        <p:spPr>
+          <a:xfrm>
+            <a:off x="4293995" y="3959478"/>
+            <a:ext cx="226415" cy="261610"/>
+          </a:xfrm>
+          <a:prstGeom prst="rect">
+            <a:avLst/>
+          </a:prstGeom>
+          <a:noFill/>
+        </p:spPr>
+        <p:txBody>
+          <a:bodyPr wrap="square" rtlCol="0">
+            <a:spAutoFit/>
+          </a:bodyPr>
+          <a:lstStyle/>
+          <a:p>
+            <a:r>
+              <a:rPr lang="el-GR" sz="1050" dirty="0" smtClean="0"/>
+              <a:t>β</a:t>
+            </a:r>
+            <a:endParaRPr lang="en-GB" sz="1050" dirty="0"/>
+          </a:p>
+        </p:txBody>
+      </p:sp>
+      <p:sp>
+        <p:nvSpPr>
+          <p:cNvPr id="76" name="TextBox 75"/>
+          <p:cNvSpPr txBox="1"/>
+          <p:nvPr/>
+        </p:nvSpPr>
+        <p:spPr>
+          <a:xfrm>
+            <a:off x="5384504" y="3738633"/>
+            <a:ext cx="226415" cy="261610"/>
+          </a:xfrm>
+          <a:prstGeom prst="rect">
+            <a:avLst/>
+          </a:prstGeom>
+          <a:noFill/>
+        </p:spPr>
+        <p:txBody>
+          <a:bodyPr wrap="square" rtlCol="0">
+            <a:spAutoFit/>
+          </a:bodyPr>
+          <a:lstStyle/>
+          <a:p>
+            <a:r>
+              <a:rPr lang="el-GR" sz="1050" dirty="0" smtClean="0"/>
+              <a:t>β</a:t>
+            </a:r>
+            <a:endParaRPr lang="en-GB" sz="1050" dirty="0"/>
+          </a:p>
+        </p:txBody>
+      </p:sp>
+      <p:cxnSp>
+        <p:nvCxnSpPr>
+          <p:cNvPr id="9" name="Straight Arrow Connector 8"/>
+          <p:cNvCxnSpPr/>
+          <p:nvPr/>
+        </p:nvCxnSpPr>
+        <p:spPr>
+          <a:xfrm>
+            <a:off x="2627784" y="3116982"/>
+            <a:ext cx="4608512" cy="0"/>
+          </a:xfrm>
+          <a:prstGeom prst="straightConnector1">
+            <a:avLst/>
+          </a:prstGeom>
+          <a:ln>
+            <a:tailEnd type="arrow"/>
+          </a:ln>
+          <a:effectLst/>
+        </p:spPr>
+        <p:style>
+          <a:lnRef idx="2">
+            <a:schemeClr val="dk1"/>
+          </a:lnRef>
+          <a:fillRef idx="0">
+            <a:schemeClr val="dk1"/>
+          </a:fillRef>
+          <a:effectRef idx="1">
+            <a:schemeClr val="dk1"/>
+          </a:effectRef>
+          <a:fontRef idx="minor">
+            <a:schemeClr val="tx1"/>
+          </a:fontRef>
+        </p:style>
+      </p:cxnSp>
+      <p:sp>
+        <p:nvSpPr>
+          <p:cNvPr id="16" name="Freeform 15"/>
+          <p:cNvSpPr/>
+          <p:nvPr/>
+        </p:nvSpPr>
+        <p:spPr>
+          <a:xfrm>
+            <a:off x="2930979" y="297153"/>
+            <a:ext cx="3976007" cy="1577235"/>
+          </a:xfrm>
+          <a:custGeom>
+            <a:avLst/>
+            <a:gdLst>
+              <a:gd name="connsiteX0" fmla="*/ 0 w 3976007"/>
+              <a:gd name="connsiteY0" fmla="*/ 703656 h 1577235"/>
+              <a:gd name="connsiteX1" fmla="*/ 930728 w 3976007"/>
+              <a:gd name="connsiteY1" fmla="*/ 17856 h 1577235"/>
+              <a:gd name="connsiteX2" fmla="*/ 3559628 w 3976007"/>
+              <a:gd name="connsiteY2" fmla="*/ 1348635 h 1577235"/>
+              <a:gd name="connsiteX3" fmla="*/ 3976007 w 3976007"/>
+              <a:gd name="connsiteY3" fmla="*/ 1577235 h 1577235"/>
+            </a:gdLst>
+            <a:ahLst/>
+            <a:cxnLst>
+              <a:cxn ang="0">
+                <a:pos x="connsiteX0" y="connsiteY0"/>
+              </a:cxn>
+              <a:cxn ang="0">
+                <a:pos x="connsiteX1" y="connsiteY1"/>
+              </a:cxn>
+              <a:cxn ang="0">
+                <a:pos x="connsiteX2" y="connsiteY2"/>
+              </a:cxn>
+              <a:cxn ang="0">
+                <a:pos x="connsiteX3" y="connsiteY3"/>
+              </a:cxn>
+            </a:cxnLst>
+            <a:rect l="l" t="t" r="r" b="b"/>
+            <a:pathLst>
+              <a:path w="3976007" h="1577235">
+                <a:moveTo>
+                  <a:pt x="0" y="703656"/>
+                </a:moveTo>
+                <a:cubicBezTo>
+                  <a:pt x="168728" y="307008"/>
+                  <a:pt x="337457" y="-89640"/>
+                  <a:pt x="930728" y="17856"/>
+                </a:cubicBezTo>
+                <a:cubicBezTo>
+                  <a:pt x="1523999" y="125352"/>
+                  <a:pt x="3052082" y="1088739"/>
+                  <a:pt x="3559628" y="1348635"/>
+                </a:cubicBezTo>
+                <a:cubicBezTo>
+                  <a:pt x="4067174" y="1608531"/>
+                  <a:pt x="3789589" y="1462935"/>
+                  <a:pt x="3976007" y="1577235"/>
+                </a:cubicBezTo>
+              </a:path>
+            </a:pathLst>
+          </a:custGeom>
+          <a:ln>
+            <a:solidFill>
+              <a:srgbClr val="99BB45"/>
+            </a:solidFill>
+          </a:ln>
+          <a:effectLst/>
+        </p:spPr>
+        <p:style>
+          <a:lnRef idx="2">
+            <a:schemeClr val="accent6"/>
+          </a:lnRef>
+          <a:fillRef idx="0">
+            <a:schemeClr val="accent6"/>
+          </a:fillRef>
+          <a:effectRef idx="1">
+            <a:schemeClr val="accent6"/>
+          </a:effectRef>
+          <a:fontRef idx="minor">
+            <a:schemeClr val="tx1"/>
+          </a:fontRef>
+        </p:style>
+        <p:txBody>
+          <a:bodyPr rtlCol="0" anchor="ctr"/>
+          <a:lstStyle/>
+          <a:p>
+            <a:pPr algn="ctr"/>
+            <a:endParaRPr lang="en-GB"/>
+          </a:p>
+        </p:txBody>
+      </p:sp>
+      <p:cxnSp>
+        <p:nvCxnSpPr>
+          <p:cNvPr id="36" name="Straight Connector 35"/>
+          <p:cNvCxnSpPr/>
+          <p:nvPr/>
+        </p:nvCxnSpPr>
+        <p:spPr>
+          <a:xfrm flipV="1">
+            <a:off x="3634773" y="3483949"/>
+            <a:ext cx="0" cy="216024"/>
+          </a:xfrm>
+          <a:prstGeom prst="line">
+            <a:avLst/>
+          </a:prstGeom>
+          <a:ln/>
+          <a:effectLst/>
+        </p:spPr>
+        <p:style>
+          <a:lnRef idx="2">
+            <a:schemeClr val="accent4"/>
+          </a:lnRef>
+          <a:fillRef idx="0">
+            <a:schemeClr val="accent4"/>
+          </a:fillRef>
+          <a:effectRef idx="1">
+            <a:schemeClr val="accent4"/>
+          </a:effectRef>
+          <a:fontRef idx="minor">
+            <a:schemeClr val="tx1"/>
+          </a:fontRef>
+        </p:style>
+      </p:cxnSp>
+      <p:sp>
+        <p:nvSpPr>
+          <p:cNvPr id="38" name="TextBox 37"/>
+          <p:cNvSpPr txBox="1"/>
+          <p:nvPr/>
+        </p:nvSpPr>
+        <p:spPr>
+          <a:xfrm>
+            <a:off x="3426210" y="3172732"/>
+            <a:ext cx="417126" cy="253916"/>
+          </a:xfrm>
+          <a:prstGeom prst="rect">
+            <a:avLst/>
+          </a:prstGeom>
+          <a:noFill/>
+        </p:spPr>
+        <p:txBody>
+          <a:bodyPr wrap="square" rtlCol="0">
+            <a:spAutoFit/>
+          </a:bodyPr>
+          <a:lstStyle/>
+          <a:p>
+            <a:r>
+              <a:rPr lang="en-US" sz="1050" i="1" dirty="0" smtClean="0"/>
+              <a:t>max</a:t>
+            </a:r>
+            <a:endParaRPr lang="en-GB" sz="1050" i="1" dirty="0"/>
+          </a:p>
+        </p:txBody>
+      </p:sp>
+      <p:cxnSp>
+        <p:nvCxnSpPr>
+          <p:cNvPr id="54" name="Straight Connector 53"/>
+          <p:cNvCxnSpPr/>
+          <p:nvPr/>
+        </p:nvCxnSpPr>
+        <p:spPr>
+          <a:xfrm>
+            <a:off x="2630179" y="4659507"/>
+            <a:ext cx="3946586" cy="0"/>
+          </a:xfrm>
+          <a:prstGeom prst="line">
+            <a:avLst/>
+          </a:prstGeom>
+        </p:spPr>
+        <p:style>
+          <a:lnRef idx="1">
+            <a:schemeClr val="dk1"/>
+          </a:lnRef>
+          <a:fillRef idx="0">
+            <a:schemeClr val="dk1"/>
+          </a:fillRef>
+          <a:effectRef idx="0">
+            <a:schemeClr val="dk1"/>
+          </a:effectRef>
+          <a:fontRef idx="minor">
+            <a:schemeClr val="tx1"/>
+          </a:fontRef>
+        </p:style>
+      </p:cxnSp>
+      <p:cxnSp>
+        <p:nvCxnSpPr>
+          <p:cNvPr id="56" name="Straight Connector 55"/>
+          <p:cNvCxnSpPr/>
+          <p:nvPr/>
+        </p:nvCxnSpPr>
+        <p:spPr>
+          <a:xfrm flipV="1">
+            <a:off x="3064622" y="4551051"/>
+            <a:ext cx="0" cy="216024"/>
+          </a:xfrm>
+          <a:prstGeom prst="line">
+            <a:avLst/>
+          </a:prstGeom>
+          <a:ln>
+            <a:solidFill>
+              <a:schemeClr val="accent1"/>
+            </a:solidFill>
+          </a:ln>
+          <a:effectLst/>
+        </p:spPr>
+        <p:style>
+          <a:lnRef idx="2">
+            <a:schemeClr val="accent5"/>
+          </a:lnRef>
+          <a:fillRef idx="0">
+            <a:schemeClr val="accent5"/>
+          </a:fillRef>
+          <a:effectRef idx="1">
+            <a:schemeClr val="accent5"/>
+          </a:effectRef>
+          <a:fontRef idx="minor">
+            <a:schemeClr val="tx1"/>
+          </a:fontRef>
+        </p:style>
+      </p:cxnSp>
+      <p:cxnSp>
+        <p:nvCxnSpPr>
+          <p:cNvPr id="57" name="Straight Connector 56"/>
+          <p:cNvCxnSpPr/>
+          <p:nvPr/>
+        </p:nvCxnSpPr>
+        <p:spPr>
+          <a:xfrm flipV="1">
+            <a:off x="4407760" y="4550126"/>
+            <a:ext cx="0" cy="216024"/>
+          </a:xfrm>
+          <a:prstGeom prst="line">
+            <a:avLst/>
+          </a:prstGeom>
+          <a:effectLst/>
+        </p:spPr>
+        <p:style>
+          <a:lnRef idx="2">
+            <a:schemeClr val="accent2"/>
+          </a:lnRef>
+          <a:fillRef idx="0">
+            <a:schemeClr val="accent2"/>
+          </a:fillRef>
+          <a:effectRef idx="1">
+            <a:schemeClr val="accent2"/>
+          </a:effectRef>
+          <a:fontRef idx="minor">
+            <a:schemeClr val="tx1"/>
+          </a:fontRef>
+        </p:style>
+      </p:cxnSp>
+      <p:cxnSp>
+        <p:nvCxnSpPr>
+          <p:cNvPr id="58" name="Straight Connector 57"/>
+          <p:cNvCxnSpPr/>
+          <p:nvPr/>
+        </p:nvCxnSpPr>
+        <p:spPr>
+          <a:xfrm flipV="1">
+            <a:off x="5231789" y="4545937"/>
+            <a:ext cx="0" cy="216024"/>
+          </a:xfrm>
+          <a:prstGeom prst="line">
+            <a:avLst/>
+          </a:prstGeom>
+          <a:ln>
+            <a:solidFill>
+              <a:schemeClr val="accent1"/>
+            </a:solidFill>
+          </a:ln>
+          <a:effectLst/>
+        </p:spPr>
+        <p:style>
+          <a:lnRef idx="2">
+            <a:schemeClr val="accent2"/>
+          </a:lnRef>
+          <a:fillRef idx="0">
+            <a:schemeClr val="accent2"/>
+          </a:fillRef>
+          <a:effectRef idx="1">
+            <a:schemeClr val="accent2"/>
+          </a:effectRef>
+          <a:fontRef idx="minor">
+            <a:schemeClr val="tx1"/>
+          </a:fontRef>
+        </p:style>
+      </p:cxnSp>
+      <p:cxnSp>
+        <p:nvCxnSpPr>
+          <p:cNvPr id="60" name="Straight Connector 59"/>
+          <p:cNvCxnSpPr/>
+          <p:nvPr/>
+        </p:nvCxnSpPr>
+        <p:spPr>
+          <a:xfrm>
+            <a:off x="2629901" y="5227152"/>
+            <a:ext cx="2606420" cy="1048"/>
+          </a:xfrm>
+          <a:prstGeom prst="line">
+            <a:avLst/>
+          </a:prstGeom>
+        </p:spPr>
+        <p:style>
+          <a:lnRef idx="1">
+            <a:schemeClr val="dk1"/>
+          </a:lnRef>
+          <a:fillRef idx="0">
+            <a:schemeClr val="dk1"/>
+          </a:fillRef>
+          <a:effectRef idx="0">
+            <a:schemeClr val="dk1"/>
+          </a:effectRef>
+          <a:fontRef idx="minor">
+            <a:schemeClr val="tx1"/>
+          </a:fontRef>
+        </p:style>
+      </p:cxnSp>
+      <p:cxnSp>
+        <p:nvCxnSpPr>
+          <p:cNvPr id="62" name="Straight Connector 61"/>
+          <p:cNvCxnSpPr/>
+          <p:nvPr/>
+        </p:nvCxnSpPr>
+        <p:spPr>
+          <a:xfrm flipV="1">
+            <a:off x="3064344" y="5118696"/>
+            <a:ext cx="0" cy="216024"/>
+          </a:xfrm>
+          <a:prstGeom prst="line">
+            <a:avLst/>
+          </a:prstGeom>
+          <a:ln>
+            <a:solidFill>
+              <a:schemeClr val="accent1"/>
+            </a:solidFill>
+          </a:ln>
+          <a:effectLst/>
+        </p:spPr>
+        <p:style>
+          <a:lnRef idx="2">
+            <a:schemeClr val="accent5"/>
+          </a:lnRef>
+          <a:fillRef idx="0">
+            <a:schemeClr val="accent5"/>
+          </a:fillRef>
+          <a:effectRef idx="1">
+            <a:schemeClr val="accent5"/>
+          </a:effectRef>
+          <a:fontRef idx="minor">
+            <a:schemeClr val="tx1"/>
+          </a:fontRef>
+        </p:style>
+      </p:cxnSp>
+      <p:cxnSp>
+        <p:nvCxnSpPr>
+          <p:cNvPr id="63" name="Straight Connector 62"/>
+          <p:cNvCxnSpPr/>
+          <p:nvPr/>
+        </p:nvCxnSpPr>
+        <p:spPr>
+          <a:xfrm flipV="1">
+            <a:off x="4407482" y="5117771"/>
+            <a:ext cx="0" cy="216024"/>
+          </a:xfrm>
+          <a:prstGeom prst="line">
+            <a:avLst/>
+          </a:prstGeom>
+          <a:ln>
+            <a:solidFill>
+              <a:schemeClr val="accent1"/>
+            </a:solidFill>
+          </a:ln>
+          <a:effectLst/>
+        </p:spPr>
+        <p:style>
+          <a:lnRef idx="2">
+            <a:schemeClr val="accent2"/>
+          </a:lnRef>
+          <a:fillRef idx="0">
+            <a:schemeClr val="accent2"/>
+          </a:fillRef>
+          <a:effectRef idx="1">
+            <a:schemeClr val="accent2"/>
+          </a:effectRef>
+          <a:fontRef idx="minor">
+            <a:schemeClr val="tx1"/>
+          </a:fontRef>
+        </p:style>
+      </p:cxnSp>
+      <p:cxnSp>
+        <p:nvCxnSpPr>
+          <p:cNvPr id="65" name="Straight Connector 64"/>
+          <p:cNvCxnSpPr/>
+          <p:nvPr/>
+        </p:nvCxnSpPr>
+        <p:spPr>
+          <a:xfrm flipV="1">
+            <a:off x="3896672" y="5120188"/>
+            <a:ext cx="0" cy="216024"/>
+          </a:xfrm>
+          <a:prstGeom prst="line">
+            <a:avLst/>
+          </a:prstGeom>
+          <a:effectLst/>
+        </p:spPr>
+        <p:style>
+          <a:lnRef idx="2">
+            <a:schemeClr val="accent2"/>
+          </a:lnRef>
+          <a:fillRef idx="0">
+            <a:schemeClr val="accent2"/>
+          </a:fillRef>
+          <a:effectRef idx="1">
+            <a:schemeClr val="accent2"/>
+          </a:effectRef>
+          <a:fontRef idx="minor">
+            <a:schemeClr val="tx1"/>
+          </a:fontRef>
+        </p:style>
+      </p:cxnSp>
+      <p:cxnSp>
+        <p:nvCxnSpPr>
+          <p:cNvPr id="67" name="Straight Connector 66"/>
+          <p:cNvCxnSpPr/>
+          <p:nvPr/>
+        </p:nvCxnSpPr>
+        <p:spPr>
+          <a:xfrm flipV="1">
+            <a:off x="3898615" y="4551051"/>
+            <a:ext cx="0" cy="216024"/>
+          </a:xfrm>
+          <a:prstGeom prst="line">
+            <a:avLst/>
+          </a:prstGeom>
+          <a:effectLst/>
+        </p:spPr>
+        <p:style>
+          <a:lnRef idx="2">
+            <a:schemeClr val="accent2"/>
+          </a:lnRef>
+          <a:fillRef idx="0">
+            <a:schemeClr val="accent2"/>
+          </a:fillRef>
+          <a:effectRef idx="1">
+            <a:schemeClr val="accent2"/>
+          </a:effectRef>
+          <a:fontRef idx="minor">
+            <a:schemeClr val="tx1"/>
+          </a:fontRef>
+        </p:style>
+      </p:cxnSp>
+      <p:sp>
+        <p:nvSpPr>
+          <p:cNvPr id="68" name="Rectangle 67"/>
+          <p:cNvSpPr/>
+          <p:nvPr/>
+        </p:nvSpPr>
+        <p:spPr>
+          <a:xfrm>
+            <a:off x="5084162" y="4211572"/>
+            <a:ext cx="290464" cy="338554"/>
+          </a:xfrm>
+          <a:prstGeom prst="rect">
+            <a:avLst/>
+          </a:prstGeom>
+        </p:spPr>
+        <p:txBody>
+          <a:bodyPr wrap="none">
+            <a:spAutoFit/>
+          </a:bodyPr>
+          <a:lstStyle/>
+          <a:p>
+            <a:pPr algn="ctr"/>
+            <a:r>
+              <a:rPr lang="en-US" sz="1600" i="1" dirty="0"/>
+              <a:t>b</a:t>
+            </a:r>
+            <a:endParaRPr lang="en-GB" sz="1600" i="1" dirty="0"/>
+          </a:p>
+        </p:txBody>
+      </p:sp>
+      <p:sp>
+        <p:nvSpPr>
+          <p:cNvPr id="71" name="TextBox 70"/>
+          <p:cNvSpPr txBox="1"/>
+          <p:nvPr/>
+        </p:nvSpPr>
+        <p:spPr>
+          <a:xfrm>
+            <a:off x="3682591" y="4212497"/>
+            <a:ext cx="432048" cy="338554"/>
+          </a:xfrm>
+          <a:prstGeom prst="rect">
+            <a:avLst/>
+          </a:prstGeom>
+          <a:noFill/>
+        </p:spPr>
+        <p:txBody>
+          <a:bodyPr wrap="square" rtlCol="0">
+            <a:spAutoFit/>
+          </a:bodyPr>
+          <a:lstStyle/>
+          <a:p>
+            <a:pPr algn="ctr"/>
+            <a:r>
+              <a:rPr lang="en-US" sz="1600" i="1" dirty="0" smtClean="0"/>
+              <a:t>p</a:t>
+            </a:r>
+            <a:r>
+              <a:rPr lang="en-US" sz="1600" i="1" baseline="-25000" dirty="0" smtClean="0"/>
+              <a:t>1</a:t>
+            </a:r>
+            <a:endParaRPr lang="en-GB" sz="1600" i="1" baseline="-25000" dirty="0"/>
+          </a:p>
+        </p:txBody>
+      </p:sp>
+      <p:sp>
+        <p:nvSpPr>
+          <p:cNvPr id="73" name="TextBox 72"/>
+          <p:cNvSpPr txBox="1"/>
+          <p:nvPr/>
+        </p:nvSpPr>
+        <p:spPr>
+          <a:xfrm>
+            <a:off x="4191458" y="4211572"/>
+            <a:ext cx="432048" cy="338554"/>
+          </a:xfrm>
+          <a:prstGeom prst="rect">
+            <a:avLst/>
+          </a:prstGeom>
+          <a:noFill/>
+        </p:spPr>
+        <p:txBody>
+          <a:bodyPr wrap="square" rtlCol="0">
+            <a:spAutoFit/>
+          </a:bodyPr>
+          <a:lstStyle/>
+          <a:p>
+            <a:pPr algn="ctr"/>
+            <a:r>
+              <a:rPr lang="en-US" sz="1600" i="1" dirty="0" smtClean="0"/>
+              <a:t>p</a:t>
+            </a:r>
+            <a:r>
+              <a:rPr lang="en-US" sz="1600" i="1" baseline="-25000" dirty="0" smtClean="0"/>
+              <a:t>2</a:t>
+            </a:r>
+            <a:endParaRPr lang="en-GB" sz="1600" i="1" baseline="-25000" dirty="0"/>
+          </a:p>
+        </p:txBody>
+      </p:sp>
+      <p:sp>
+        <p:nvSpPr>
+          <p:cNvPr id="77" name="TextBox 76"/>
+          <p:cNvSpPr txBox="1"/>
+          <p:nvPr/>
+        </p:nvSpPr>
+        <p:spPr>
+          <a:xfrm>
+            <a:off x="2953270" y="4213167"/>
+            <a:ext cx="216024" cy="338554"/>
+          </a:xfrm>
+          <a:prstGeom prst="rect">
+            <a:avLst/>
+          </a:prstGeom>
+          <a:noFill/>
+        </p:spPr>
+        <p:txBody>
+          <a:bodyPr wrap="square" rtlCol="0">
+            <a:spAutoFit/>
+          </a:bodyPr>
+          <a:lstStyle/>
+          <a:p>
+            <a:pPr algn="ctr"/>
+            <a:r>
+              <a:rPr lang="en-US" sz="1600" i="1" dirty="0" smtClean="0"/>
+              <a:t>a</a:t>
+            </a:r>
+            <a:endParaRPr lang="en-GB" sz="1600" i="1" dirty="0"/>
+          </a:p>
+        </p:txBody>
+      </p:sp>
+      <p:cxnSp>
+        <p:nvCxnSpPr>
+          <p:cNvPr id="78" name="Straight Connector 77"/>
+          <p:cNvCxnSpPr/>
+          <p:nvPr/>
+        </p:nvCxnSpPr>
+        <p:spPr>
+          <a:xfrm flipV="1">
+            <a:off x="3573210" y="5120188"/>
+            <a:ext cx="0" cy="216024"/>
+          </a:xfrm>
+          <a:prstGeom prst="line">
+            <a:avLst/>
+          </a:prstGeom>
+          <a:ln/>
+          <a:effectLst/>
+        </p:spPr>
+        <p:style>
+          <a:lnRef idx="2">
+            <a:schemeClr val="accent2"/>
+          </a:lnRef>
+          <a:fillRef idx="0">
+            <a:schemeClr val="accent2"/>
+          </a:fillRef>
+          <a:effectRef idx="1">
+            <a:schemeClr val="accent2"/>
+          </a:effectRef>
+          <a:fontRef idx="minor">
+            <a:schemeClr val="tx1"/>
+          </a:fontRef>
+        </p:style>
+      </p:cxnSp>
+      <p:sp>
+        <p:nvSpPr>
+          <p:cNvPr id="79" name="Rectangle 78"/>
+          <p:cNvSpPr/>
+          <p:nvPr/>
+        </p:nvSpPr>
+        <p:spPr>
+          <a:xfrm>
+            <a:off x="4262250" y="4792750"/>
+            <a:ext cx="290464" cy="338554"/>
+          </a:xfrm>
+          <a:prstGeom prst="rect">
+            <a:avLst/>
+          </a:prstGeom>
+        </p:spPr>
+        <p:txBody>
+          <a:bodyPr wrap="none">
+            <a:spAutoFit/>
+          </a:bodyPr>
+          <a:lstStyle/>
+          <a:p>
+            <a:pPr algn="ctr"/>
+            <a:r>
+              <a:rPr lang="en-US" sz="1600" i="1" dirty="0"/>
+              <a:t>b</a:t>
+            </a:r>
+            <a:endParaRPr lang="en-GB" sz="1600" i="1" dirty="0"/>
+          </a:p>
+        </p:txBody>
+      </p:sp>
+      <p:sp>
+        <p:nvSpPr>
+          <p:cNvPr id="80" name="TextBox 79"/>
+          <p:cNvSpPr txBox="1"/>
+          <p:nvPr/>
+        </p:nvSpPr>
+        <p:spPr>
+          <a:xfrm>
+            <a:off x="3682591" y="4793420"/>
+            <a:ext cx="432048" cy="338554"/>
+          </a:xfrm>
+          <a:prstGeom prst="rect">
+            <a:avLst/>
+          </a:prstGeom>
+          <a:noFill/>
+        </p:spPr>
+        <p:txBody>
+          <a:bodyPr wrap="square" rtlCol="0">
+            <a:spAutoFit/>
+          </a:bodyPr>
+          <a:lstStyle/>
+          <a:p>
+            <a:pPr algn="ctr"/>
+            <a:r>
+              <a:rPr lang="en-US" sz="1600" i="1" dirty="0" smtClean="0"/>
+              <a:t>p</a:t>
+            </a:r>
+            <a:r>
+              <a:rPr lang="en-US" sz="1600" i="1" baseline="-25000" dirty="0" smtClean="0"/>
+              <a:t>2</a:t>
+            </a:r>
+            <a:endParaRPr lang="en-GB" sz="1600" i="1" baseline="-25000" dirty="0"/>
+          </a:p>
+        </p:txBody>
+      </p:sp>
+      <p:sp>
+        <p:nvSpPr>
+          <p:cNvPr id="81" name="TextBox 80"/>
+          <p:cNvSpPr txBox="1"/>
+          <p:nvPr/>
+        </p:nvSpPr>
+        <p:spPr>
+          <a:xfrm>
+            <a:off x="3334278" y="4793420"/>
+            <a:ext cx="432048" cy="338554"/>
+          </a:xfrm>
+          <a:prstGeom prst="rect">
+            <a:avLst/>
+          </a:prstGeom>
+          <a:noFill/>
+        </p:spPr>
+        <p:txBody>
+          <a:bodyPr wrap="square" rtlCol="0">
+            <a:spAutoFit/>
+          </a:bodyPr>
+          <a:lstStyle/>
+          <a:p>
+            <a:pPr algn="ctr"/>
+            <a:r>
+              <a:rPr lang="en-US" sz="1600" i="1" dirty="0" smtClean="0"/>
+              <a:t>p</a:t>
+            </a:r>
+            <a:r>
+              <a:rPr lang="en-US" sz="1600" i="1" baseline="-25000" dirty="0" smtClean="0"/>
+              <a:t>1</a:t>
+            </a:r>
+            <a:endParaRPr lang="en-GB" sz="1600" i="1" baseline="-25000" dirty="0"/>
+          </a:p>
+        </p:txBody>
+      </p:sp>
+      <p:sp>
+        <p:nvSpPr>
+          <p:cNvPr id="82" name="TextBox 81"/>
+          <p:cNvSpPr txBox="1"/>
+          <p:nvPr/>
+        </p:nvSpPr>
+        <p:spPr>
+          <a:xfrm>
+            <a:off x="2953270" y="4793420"/>
+            <a:ext cx="216024" cy="338554"/>
+          </a:xfrm>
+          <a:prstGeom prst="rect">
+            <a:avLst/>
+          </a:prstGeom>
+          <a:noFill/>
+        </p:spPr>
+        <p:txBody>
+          <a:bodyPr wrap="square" rtlCol="0">
+            <a:spAutoFit/>
+          </a:bodyPr>
+          <a:lstStyle/>
+          <a:p>
+            <a:pPr algn="ctr"/>
+            <a:r>
+              <a:rPr lang="en-US" sz="1600" i="1" dirty="0" smtClean="0"/>
+              <a:t>a</a:t>
+            </a:r>
+            <a:endParaRPr lang="en-GB" sz="1600" i="1" dirty="0"/>
+          </a:p>
+        </p:txBody>
+      </p:sp>
+      <p:cxnSp>
+        <p:nvCxnSpPr>
+          <p:cNvPr id="83" name="Straight Connector 82"/>
+          <p:cNvCxnSpPr/>
+          <p:nvPr/>
+        </p:nvCxnSpPr>
+        <p:spPr>
+          <a:xfrm flipV="1">
+            <a:off x="2627784" y="5781670"/>
+            <a:ext cx="1782391" cy="444"/>
+          </a:xfrm>
+          <a:prstGeom prst="line">
+            <a:avLst/>
+          </a:prstGeom>
+        </p:spPr>
+        <p:style>
+          <a:lnRef idx="1">
+            <a:schemeClr val="dk1"/>
+          </a:lnRef>
+          <a:fillRef idx="0">
+            <a:schemeClr val="dk1"/>
+          </a:fillRef>
+          <a:effectRef idx="0">
+            <a:schemeClr val="dk1"/>
+          </a:effectRef>
+          <a:fontRef idx="minor">
+            <a:schemeClr val="tx1"/>
+          </a:fontRef>
+        </p:style>
+      </p:cxnSp>
+      <p:cxnSp>
+        <p:nvCxnSpPr>
+          <p:cNvPr id="84" name="Straight Connector 83"/>
+          <p:cNvCxnSpPr/>
+          <p:nvPr/>
+        </p:nvCxnSpPr>
+        <p:spPr>
+          <a:xfrm flipV="1">
+            <a:off x="3062227" y="5673658"/>
+            <a:ext cx="0" cy="216024"/>
+          </a:xfrm>
+          <a:prstGeom prst="line">
+            <a:avLst/>
+          </a:prstGeom>
+          <a:ln>
+            <a:solidFill>
+              <a:schemeClr val="accent1"/>
+            </a:solidFill>
+          </a:ln>
+          <a:effectLst/>
+        </p:spPr>
+        <p:style>
+          <a:lnRef idx="2">
+            <a:schemeClr val="accent5"/>
+          </a:lnRef>
+          <a:fillRef idx="0">
+            <a:schemeClr val="accent5"/>
+          </a:fillRef>
+          <a:effectRef idx="1">
+            <a:schemeClr val="accent5"/>
+          </a:effectRef>
+          <a:fontRef idx="minor">
+            <a:schemeClr val="tx1"/>
+          </a:fontRef>
+        </p:style>
+      </p:cxnSp>
+      <p:cxnSp>
+        <p:nvCxnSpPr>
+          <p:cNvPr id="85" name="Straight Connector 84"/>
+          <p:cNvCxnSpPr/>
+          <p:nvPr/>
+        </p:nvCxnSpPr>
+        <p:spPr>
+          <a:xfrm flipV="1">
+            <a:off x="3387632" y="5675777"/>
+            <a:ext cx="0" cy="216024"/>
+          </a:xfrm>
+          <a:prstGeom prst="line">
+            <a:avLst/>
+          </a:prstGeom>
+          <a:ln/>
+          <a:effectLst/>
+        </p:spPr>
+        <p:style>
+          <a:lnRef idx="2">
+            <a:schemeClr val="accent2"/>
+          </a:lnRef>
+          <a:fillRef idx="0">
+            <a:schemeClr val="accent2"/>
+          </a:fillRef>
+          <a:effectRef idx="1">
+            <a:schemeClr val="accent2"/>
+          </a:effectRef>
+          <a:fontRef idx="minor">
+            <a:schemeClr val="tx1"/>
+          </a:fontRef>
+        </p:style>
+      </p:cxnSp>
+      <p:cxnSp>
+        <p:nvCxnSpPr>
+          <p:cNvPr id="86" name="Straight Connector 85"/>
+          <p:cNvCxnSpPr/>
+          <p:nvPr/>
+        </p:nvCxnSpPr>
+        <p:spPr>
+          <a:xfrm flipV="1">
+            <a:off x="3894555" y="5675150"/>
+            <a:ext cx="0" cy="216024"/>
+          </a:xfrm>
+          <a:prstGeom prst="line">
+            <a:avLst/>
+          </a:prstGeom>
+          <a:ln>
+            <a:solidFill>
+              <a:schemeClr val="accent1"/>
+            </a:solidFill>
+          </a:ln>
+          <a:effectLst/>
+        </p:spPr>
+        <p:style>
+          <a:lnRef idx="2">
+            <a:schemeClr val="accent2"/>
+          </a:lnRef>
+          <a:fillRef idx="0">
+            <a:schemeClr val="accent2"/>
+          </a:fillRef>
+          <a:effectRef idx="1">
+            <a:schemeClr val="accent2"/>
+          </a:effectRef>
+          <a:fontRef idx="minor">
+            <a:schemeClr val="tx1"/>
+          </a:fontRef>
+        </p:style>
+      </p:cxnSp>
+      <p:cxnSp>
+        <p:nvCxnSpPr>
+          <p:cNvPr id="87" name="Straight Connector 86"/>
+          <p:cNvCxnSpPr/>
+          <p:nvPr/>
+        </p:nvCxnSpPr>
+        <p:spPr>
+          <a:xfrm flipV="1">
+            <a:off x="3571093" y="5675150"/>
+            <a:ext cx="0" cy="216024"/>
+          </a:xfrm>
+          <a:prstGeom prst="line">
+            <a:avLst/>
+          </a:prstGeom>
+          <a:ln/>
+          <a:effectLst/>
+        </p:spPr>
+        <p:style>
+          <a:lnRef idx="2">
+            <a:schemeClr val="accent2"/>
+          </a:lnRef>
+          <a:fillRef idx="0">
+            <a:schemeClr val="accent2"/>
+          </a:fillRef>
+          <a:effectRef idx="1">
+            <a:schemeClr val="accent2"/>
+          </a:effectRef>
+          <a:fontRef idx="minor">
+            <a:schemeClr val="tx1"/>
+          </a:fontRef>
+        </p:style>
+      </p:cxnSp>
+      <p:sp>
+        <p:nvSpPr>
+          <p:cNvPr id="88" name="TextBox 87"/>
+          <p:cNvSpPr txBox="1"/>
+          <p:nvPr/>
+        </p:nvSpPr>
+        <p:spPr>
+          <a:xfrm>
+            <a:off x="2961333" y="5337223"/>
+            <a:ext cx="216024" cy="338554"/>
+          </a:xfrm>
+          <a:prstGeom prst="rect">
+            <a:avLst/>
+          </a:prstGeom>
+          <a:noFill/>
+        </p:spPr>
+        <p:txBody>
+          <a:bodyPr wrap="square" rtlCol="0">
+            <a:spAutoFit/>
+          </a:bodyPr>
+          <a:lstStyle/>
+          <a:p>
+            <a:pPr algn="ctr"/>
+            <a:r>
+              <a:rPr lang="en-US" sz="1600" i="1" dirty="0" smtClean="0"/>
+              <a:t>a</a:t>
+            </a:r>
+            <a:endParaRPr lang="en-GB" sz="1600" i="1" dirty="0"/>
+          </a:p>
+        </p:txBody>
+      </p:sp>
+      <p:sp>
+        <p:nvSpPr>
+          <p:cNvPr id="89" name="Rectangle 88"/>
+          <p:cNvSpPr/>
+          <p:nvPr/>
+        </p:nvSpPr>
+        <p:spPr>
+          <a:xfrm>
+            <a:off x="3753383" y="5346930"/>
+            <a:ext cx="290464" cy="338554"/>
+          </a:xfrm>
+          <a:prstGeom prst="rect">
+            <a:avLst/>
+          </a:prstGeom>
+        </p:spPr>
+        <p:txBody>
+          <a:bodyPr wrap="none">
+            <a:spAutoFit/>
+          </a:bodyPr>
+          <a:lstStyle/>
+          <a:p>
+            <a:pPr algn="ctr"/>
+            <a:r>
+              <a:rPr lang="en-US" sz="1600" i="1" dirty="0"/>
+              <a:t>b</a:t>
+            </a:r>
+            <a:endParaRPr lang="en-GB" sz="1600" i="1" dirty="0"/>
+          </a:p>
+        </p:txBody>
+      </p:sp>
+      <p:cxnSp>
+        <p:nvCxnSpPr>
+          <p:cNvPr id="91" name="Straight Connector 90"/>
+          <p:cNvCxnSpPr/>
+          <p:nvPr/>
+        </p:nvCxnSpPr>
+        <p:spPr>
+          <a:xfrm flipH="1" flipV="1">
+            <a:off x="3633332" y="3594617"/>
+            <a:ext cx="17983" cy="2930727"/>
+          </a:xfrm>
+          <a:prstGeom prst="line">
+            <a:avLst/>
+          </a:prstGeom>
+          <a:ln/>
+        </p:spPr>
+        <p:style>
+          <a:lnRef idx="1">
+            <a:schemeClr val="accent4"/>
+          </a:lnRef>
+          <a:fillRef idx="0">
+            <a:schemeClr val="accent4"/>
+          </a:fillRef>
+          <a:effectRef idx="0">
+            <a:schemeClr val="accent4"/>
+          </a:effectRef>
+          <a:fontRef idx="minor">
+            <a:schemeClr val="tx1"/>
+          </a:fontRef>
+        </p:style>
+      </p:cxnSp>
+      <p:sp>
+        <p:nvSpPr>
+          <p:cNvPr id="92" name="TextBox 91"/>
+          <p:cNvSpPr txBox="1"/>
+          <p:nvPr/>
+        </p:nvSpPr>
+        <p:spPr>
+          <a:xfrm>
+            <a:off x="3334288" y="5346930"/>
+            <a:ext cx="432048" cy="338554"/>
+          </a:xfrm>
+          <a:prstGeom prst="rect">
+            <a:avLst/>
+          </a:prstGeom>
+          <a:noFill/>
+        </p:spPr>
+        <p:txBody>
+          <a:bodyPr wrap="square" rtlCol="0">
+            <a:spAutoFit/>
+          </a:bodyPr>
+          <a:lstStyle/>
+          <a:p>
+            <a:pPr algn="ctr"/>
+            <a:r>
+              <a:rPr lang="en-US" sz="1600" i="1" dirty="0" smtClean="0"/>
+              <a:t>p</a:t>
+            </a:r>
+            <a:r>
+              <a:rPr lang="en-US" sz="1600" i="1" baseline="-25000" dirty="0" smtClean="0"/>
+              <a:t>2</a:t>
+            </a:r>
+            <a:endParaRPr lang="en-GB" sz="1600" i="1" baseline="-25000" dirty="0"/>
+          </a:p>
+        </p:txBody>
+      </p:sp>
+      <p:sp>
+        <p:nvSpPr>
+          <p:cNvPr id="93" name="TextBox 92"/>
+          <p:cNvSpPr txBox="1"/>
+          <p:nvPr/>
+        </p:nvSpPr>
+        <p:spPr>
+          <a:xfrm>
+            <a:off x="3152541" y="5336887"/>
+            <a:ext cx="432048" cy="338554"/>
+          </a:xfrm>
+          <a:prstGeom prst="rect">
+            <a:avLst/>
+          </a:prstGeom>
+          <a:noFill/>
+        </p:spPr>
+        <p:txBody>
+          <a:bodyPr wrap="square" rtlCol="0">
+            <a:spAutoFit/>
+          </a:bodyPr>
+          <a:lstStyle/>
+          <a:p>
+            <a:pPr algn="ctr"/>
+            <a:r>
+              <a:rPr lang="en-US" sz="1600" i="1" dirty="0" smtClean="0"/>
+              <a:t>p</a:t>
+            </a:r>
+            <a:r>
+              <a:rPr lang="en-US" sz="1600" i="1" baseline="-25000" dirty="0" smtClean="0"/>
+              <a:t>1</a:t>
+            </a:r>
+            <a:endParaRPr lang="en-GB" sz="1600" i="1" baseline="-25000" dirty="0"/>
+          </a:p>
+        </p:txBody>
+      </p:sp>
+      <p:cxnSp>
+        <p:nvCxnSpPr>
+          <p:cNvPr id="94" name="Straight Connector 93"/>
+          <p:cNvCxnSpPr/>
+          <p:nvPr/>
+        </p:nvCxnSpPr>
+        <p:spPr>
+          <a:xfrm>
+            <a:off x="3061282" y="6344697"/>
+            <a:ext cx="1348893" cy="627"/>
+          </a:xfrm>
+          <a:prstGeom prst="line">
+            <a:avLst/>
+          </a:prstGeom>
+        </p:spPr>
+        <p:style>
+          <a:lnRef idx="1">
+            <a:schemeClr val="dk1"/>
+          </a:lnRef>
+          <a:fillRef idx="0">
+            <a:schemeClr val="dk1"/>
+          </a:fillRef>
+          <a:effectRef idx="0">
+            <a:schemeClr val="dk1"/>
+          </a:effectRef>
+          <a:fontRef idx="minor">
+            <a:schemeClr val="tx1"/>
+          </a:fontRef>
+        </p:style>
+      </p:cxnSp>
+      <p:cxnSp>
+        <p:nvCxnSpPr>
+          <p:cNvPr id="95" name="Straight Connector 94"/>
+          <p:cNvCxnSpPr/>
+          <p:nvPr/>
+        </p:nvCxnSpPr>
+        <p:spPr>
+          <a:xfrm flipV="1">
+            <a:off x="3710299" y="6235193"/>
+            <a:ext cx="0" cy="216024"/>
+          </a:xfrm>
+          <a:prstGeom prst="line">
+            <a:avLst/>
+          </a:prstGeom>
+          <a:ln/>
+          <a:effectLst/>
+        </p:spPr>
+        <p:style>
+          <a:lnRef idx="2">
+            <a:schemeClr val="accent2"/>
+          </a:lnRef>
+          <a:fillRef idx="0">
+            <a:schemeClr val="accent2"/>
+          </a:fillRef>
+          <a:effectRef idx="1">
+            <a:schemeClr val="accent2"/>
+          </a:effectRef>
+          <a:fontRef idx="minor">
+            <a:schemeClr val="tx1"/>
+          </a:fontRef>
+        </p:style>
+      </p:cxnSp>
+      <p:cxnSp>
+        <p:nvCxnSpPr>
+          <p:cNvPr id="96" name="Straight Connector 95"/>
+          <p:cNvCxnSpPr/>
+          <p:nvPr/>
+        </p:nvCxnSpPr>
+        <p:spPr>
+          <a:xfrm flipV="1">
+            <a:off x="3390027" y="6237312"/>
+            <a:ext cx="0" cy="216024"/>
+          </a:xfrm>
+          <a:prstGeom prst="line">
+            <a:avLst/>
+          </a:prstGeom>
+          <a:ln>
+            <a:solidFill>
+              <a:schemeClr val="accent1"/>
+            </a:solidFill>
+          </a:ln>
+          <a:effectLst/>
+        </p:spPr>
+        <p:style>
+          <a:lnRef idx="2">
+            <a:schemeClr val="accent2"/>
+          </a:lnRef>
+          <a:fillRef idx="0">
+            <a:schemeClr val="accent2"/>
+          </a:fillRef>
+          <a:effectRef idx="1">
+            <a:schemeClr val="accent2"/>
+          </a:effectRef>
+          <a:fontRef idx="minor">
+            <a:schemeClr val="tx1"/>
+          </a:fontRef>
+        </p:style>
+      </p:cxnSp>
+      <p:cxnSp>
+        <p:nvCxnSpPr>
+          <p:cNvPr id="97" name="Straight Connector 96"/>
+          <p:cNvCxnSpPr/>
+          <p:nvPr/>
+        </p:nvCxnSpPr>
+        <p:spPr>
+          <a:xfrm flipV="1">
+            <a:off x="3896950" y="6236685"/>
+            <a:ext cx="0" cy="216024"/>
+          </a:xfrm>
+          <a:prstGeom prst="line">
+            <a:avLst/>
+          </a:prstGeom>
+          <a:ln>
+            <a:solidFill>
+              <a:schemeClr val="accent1"/>
+            </a:solidFill>
+          </a:ln>
+          <a:effectLst/>
+        </p:spPr>
+        <p:style>
+          <a:lnRef idx="2">
+            <a:schemeClr val="accent2"/>
+          </a:lnRef>
+          <a:fillRef idx="0">
+            <a:schemeClr val="accent2"/>
+          </a:fillRef>
+          <a:effectRef idx="1">
+            <a:schemeClr val="accent2"/>
+          </a:effectRef>
+          <a:fontRef idx="minor">
+            <a:schemeClr val="tx1"/>
+          </a:fontRef>
+        </p:style>
+      </p:cxnSp>
+      <p:cxnSp>
+        <p:nvCxnSpPr>
+          <p:cNvPr id="98" name="Straight Connector 97"/>
+          <p:cNvCxnSpPr/>
+          <p:nvPr/>
+        </p:nvCxnSpPr>
+        <p:spPr>
+          <a:xfrm flipV="1">
+            <a:off x="3573488" y="6236685"/>
+            <a:ext cx="0" cy="216024"/>
+          </a:xfrm>
+          <a:prstGeom prst="line">
+            <a:avLst/>
+          </a:prstGeom>
+          <a:ln/>
+          <a:effectLst/>
+        </p:spPr>
+        <p:style>
+          <a:lnRef idx="2">
+            <a:schemeClr val="accent2"/>
+          </a:lnRef>
+          <a:fillRef idx="0">
+            <a:schemeClr val="accent2"/>
+          </a:fillRef>
+          <a:effectRef idx="1">
+            <a:schemeClr val="accent2"/>
+          </a:effectRef>
+          <a:fontRef idx="minor">
+            <a:schemeClr val="tx1"/>
+          </a:fontRef>
+        </p:style>
+      </p:cxnSp>
+      <p:sp>
+        <p:nvSpPr>
+          <p:cNvPr id="99" name="TextBox 98"/>
+          <p:cNvSpPr txBox="1"/>
+          <p:nvPr/>
+        </p:nvSpPr>
+        <p:spPr>
+          <a:xfrm>
+            <a:off x="3267480" y="5908465"/>
+            <a:ext cx="216024" cy="307777"/>
+          </a:xfrm>
+          <a:prstGeom prst="rect">
+            <a:avLst/>
+          </a:prstGeom>
+          <a:noFill/>
+        </p:spPr>
+        <p:txBody>
+          <a:bodyPr wrap="square" rtlCol="0">
+            <a:spAutoFit/>
+          </a:bodyPr>
+          <a:lstStyle/>
+          <a:p>
+            <a:pPr algn="ctr"/>
+            <a:r>
+              <a:rPr lang="en-US" sz="1400" i="1" dirty="0" smtClean="0"/>
+              <a:t>a</a:t>
+            </a:r>
+            <a:endParaRPr lang="en-GB" sz="1400" i="1" dirty="0"/>
+          </a:p>
+        </p:txBody>
+      </p:sp>
+      <p:sp>
+        <p:nvSpPr>
+          <p:cNvPr id="100" name="Rectangle 99"/>
+          <p:cNvSpPr/>
+          <p:nvPr/>
+        </p:nvSpPr>
+        <p:spPr>
+          <a:xfrm>
+            <a:off x="3762190" y="5908465"/>
+            <a:ext cx="277640" cy="307777"/>
+          </a:xfrm>
+          <a:prstGeom prst="rect">
+            <a:avLst/>
+          </a:prstGeom>
+        </p:spPr>
+        <p:txBody>
+          <a:bodyPr wrap="none">
+            <a:spAutoFit/>
+          </a:bodyPr>
+          <a:lstStyle/>
+          <a:p>
+            <a:pPr algn="ctr"/>
+            <a:r>
+              <a:rPr lang="en-US" sz="1400" i="1" dirty="0"/>
+              <a:t>b</a:t>
+            </a:r>
+            <a:endParaRPr lang="en-GB" sz="1400" i="1" dirty="0"/>
+          </a:p>
+        </p:txBody>
+      </p:sp>
+      <p:sp>
+        <p:nvSpPr>
+          <p:cNvPr id="101" name="TextBox 100"/>
+          <p:cNvSpPr txBox="1"/>
+          <p:nvPr/>
+        </p:nvSpPr>
+        <p:spPr>
+          <a:xfrm>
+            <a:off x="3538006" y="5908465"/>
+            <a:ext cx="432048" cy="307777"/>
+          </a:xfrm>
+          <a:prstGeom prst="rect">
+            <a:avLst/>
+          </a:prstGeom>
+          <a:noFill/>
+        </p:spPr>
+        <p:txBody>
+          <a:bodyPr wrap="square" rtlCol="0">
+            <a:spAutoFit/>
+          </a:bodyPr>
+          <a:lstStyle/>
+          <a:p>
+            <a:pPr algn="ctr"/>
+            <a:r>
+              <a:rPr lang="en-US" sz="1400" i="1" dirty="0" smtClean="0"/>
+              <a:t>p</a:t>
+            </a:r>
+            <a:r>
+              <a:rPr lang="en-US" sz="1400" i="1" baseline="-25000" dirty="0" smtClean="0"/>
+              <a:t>2</a:t>
+            </a:r>
+            <a:endParaRPr lang="en-GB" sz="1400" i="1" baseline="-25000" dirty="0"/>
+          </a:p>
+        </p:txBody>
+      </p:sp>
+      <p:sp>
+        <p:nvSpPr>
+          <p:cNvPr id="102" name="TextBox 101"/>
+          <p:cNvSpPr txBox="1"/>
+          <p:nvPr/>
+        </p:nvSpPr>
+        <p:spPr>
+          <a:xfrm>
+            <a:off x="3348142" y="5908465"/>
+            <a:ext cx="432048" cy="307777"/>
+          </a:xfrm>
+          <a:prstGeom prst="rect">
+            <a:avLst/>
+          </a:prstGeom>
+          <a:noFill/>
+        </p:spPr>
+        <p:txBody>
+          <a:bodyPr wrap="square" rtlCol="0">
+            <a:spAutoFit/>
+          </a:bodyPr>
+          <a:lstStyle/>
+          <a:p>
+            <a:pPr algn="ctr"/>
+            <a:r>
+              <a:rPr lang="en-US" sz="1400" i="1" dirty="0" smtClean="0"/>
+              <a:t>p</a:t>
+            </a:r>
+            <a:r>
+              <a:rPr lang="en-US" sz="1400" i="1" baseline="-25000" dirty="0" smtClean="0"/>
+              <a:t>1</a:t>
+            </a:r>
+            <a:endParaRPr lang="en-GB" sz="1400" i="1" baseline="-25000" dirty="0"/>
+          </a:p>
+        </p:txBody>
+      </p:sp>
+    </p:spTree>
+    <p:extLst>
+      <p:ext uri="{BB962C8B-B14F-4D97-AF65-F5344CB8AC3E}">
+        <p14:creationId xmlns:p14="http://schemas.microsoft.com/office/powerpoint/2010/main" val="226544001"/>
+      </p:ext>
+    </p:extLst>
+  </p:cSld>
+  <p:clrMapOvr>
+    <a:masterClrMapping/>
+  </p:clrMapOvr>
+  <p:timing>
+    <p:tnLst>
+      <p:par>
+        <p:cTn id="1" dur="indefinite" restart="never" nodeType="tmRoot"/>
+      </p:par>
+    </p:tnLst>
+  </p:timing>
+</p:sld>
+</file>
+
+<file path=ppt/slides/slide7.xml><?xml version="1.0" encoding="utf-8"?>
+<p:sld xmlns:a="http://schemas.openxmlformats.org/drawingml/2006/main" xmlns:r="http://schemas.openxmlformats.org/officeDocument/2006/relationships" xmlns:p="http://schemas.openxmlformats.org/presentationml/2006/main">
+  <p:cSld>
+    <p:spTree>
+      <p:nvGrpSpPr>
+        <p:cNvPr id="1" name=""/>
+        <p:cNvGrpSpPr/>
+        <p:nvPr/>
+      </p:nvGrpSpPr>
+      <p:grpSpPr>
+        <a:xfrm>
+          <a:off x="0" y="0"/>
+          <a:ext cx="0" cy="0"/>
+          <a:chOff x="0" y="0"/>
+          <a:chExt cx="0" cy="0"/>
+        </a:xfrm>
+      </p:grpSpPr>
+      <p:sp>
+        <p:nvSpPr>
+          <p:cNvPr id="26" name="TextBox 25"/>
+          <p:cNvSpPr txBox="1"/>
+          <p:nvPr/>
+        </p:nvSpPr>
+        <p:spPr>
+          <a:xfrm>
+            <a:off x="2906487" y="1052736"/>
+            <a:ext cx="216024" cy="369332"/>
+          </a:xfrm>
+          <a:prstGeom prst="rect">
+            <a:avLst/>
+          </a:prstGeom>
+          <a:noFill/>
+        </p:spPr>
+        <p:txBody>
+          <a:bodyPr wrap="square" rtlCol="0">
+            <a:spAutoFit/>
+          </a:bodyPr>
+          <a:lstStyle/>
+          <a:p>
+            <a:pPr algn="ctr"/>
+            <a:r>
+              <a:rPr lang="en-US" i="1" dirty="0" smtClean="0"/>
+              <a:t>a</a:t>
+            </a:r>
+            <a:endParaRPr lang="en-GB" i="1" dirty="0"/>
+          </a:p>
+        </p:txBody>
+      </p:sp>
+      <p:sp>
+        <p:nvSpPr>
+          <p:cNvPr id="30" name="Rectangle 29"/>
+          <p:cNvSpPr/>
+          <p:nvPr/>
+        </p:nvSpPr>
+        <p:spPr>
+          <a:xfrm>
+            <a:off x="6406509" y="1052736"/>
+            <a:ext cx="303288" cy="369332"/>
+          </a:xfrm>
+          <a:prstGeom prst="rect">
+            <a:avLst/>
+          </a:prstGeom>
+        </p:spPr>
+        <p:txBody>
+          <a:bodyPr wrap="none">
+            <a:spAutoFit/>
+          </a:bodyPr>
+          <a:lstStyle/>
+          <a:p>
+            <a:pPr algn="ctr"/>
+            <a:r>
+              <a:rPr lang="en-US" i="1" dirty="0"/>
+              <a:t>b</a:t>
+            </a:r>
+            <a:endParaRPr lang="en-GB" i="1" dirty="0"/>
+          </a:p>
+        </p:txBody>
+      </p:sp>
+      <p:cxnSp>
+        <p:nvCxnSpPr>
+          <p:cNvPr id="37" name="Straight Connector 36"/>
+          <p:cNvCxnSpPr/>
+          <p:nvPr/>
+        </p:nvCxnSpPr>
+        <p:spPr>
+          <a:xfrm>
+            <a:off x="2625389" y="1532329"/>
+            <a:ext cx="4610907" cy="0"/>
+          </a:xfrm>
+          <a:prstGeom prst="line">
+            <a:avLst/>
+          </a:prstGeom>
+        </p:spPr>
+        <p:style>
+          <a:lnRef idx="1">
+            <a:schemeClr val="dk1"/>
+          </a:lnRef>
+          <a:fillRef idx="0">
+            <a:schemeClr val="dk1"/>
+          </a:fillRef>
+          <a:effectRef idx="0">
+            <a:schemeClr val="dk1"/>
+          </a:effectRef>
+          <a:fontRef idx="minor">
+            <a:schemeClr val="tx1"/>
+          </a:fontRef>
+        </p:style>
+      </p:cxnSp>
+      <p:cxnSp>
+        <p:nvCxnSpPr>
+          <p:cNvPr id="41" name="Straight Connector 40"/>
+          <p:cNvCxnSpPr/>
+          <p:nvPr/>
+        </p:nvCxnSpPr>
+        <p:spPr>
+          <a:xfrm flipV="1">
+            <a:off x="3059832" y="1423873"/>
+            <a:ext cx="0" cy="216024"/>
+          </a:xfrm>
+          <a:prstGeom prst="line">
+            <a:avLst/>
+          </a:prstGeom>
+          <a:ln>
+            <a:solidFill>
+              <a:schemeClr val="accent1"/>
+            </a:solidFill>
+          </a:ln>
+          <a:effectLst/>
+        </p:spPr>
+        <p:style>
+          <a:lnRef idx="2">
+            <a:schemeClr val="accent5"/>
+          </a:lnRef>
+          <a:fillRef idx="0">
+            <a:schemeClr val="accent5"/>
+          </a:fillRef>
+          <a:effectRef idx="1">
+            <a:schemeClr val="accent5"/>
+          </a:effectRef>
+          <a:fontRef idx="minor">
+            <a:schemeClr val="tx1"/>
+          </a:fontRef>
+        </p:style>
+      </p:cxnSp>
+      <p:cxnSp>
+        <p:nvCxnSpPr>
+          <p:cNvPr id="47" name="Straight Connector 46"/>
+          <p:cNvCxnSpPr/>
+          <p:nvPr/>
+        </p:nvCxnSpPr>
+        <p:spPr>
+          <a:xfrm flipV="1">
+            <a:off x="6556856" y="1422914"/>
+            <a:ext cx="0" cy="216024"/>
+          </a:xfrm>
+          <a:prstGeom prst="line">
+            <a:avLst/>
+          </a:prstGeom>
+          <a:ln>
+            <a:solidFill>
+              <a:schemeClr val="accent1"/>
+            </a:solidFill>
+          </a:ln>
+          <a:effectLst/>
+        </p:spPr>
+        <p:style>
+          <a:lnRef idx="2">
+            <a:schemeClr val="accent5"/>
+          </a:lnRef>
+          <a:fillRef idx="0">
+            <a:schemeClr val="accent5"/>
+          </a:fillRef>
+          <a:effectRef idx="1">
+            <a:schemeClr val="accent5"/>
+          </a:effectRef>
+          <a:fontRef idx="minor">
+            <a:schemeClr val="tx1"/>
+          </a:fontRef>
+        </p:style>
+      </p:cxnSp>
+      <p:cxnSp>
+        <p:nvCxnSpPr>
+          <p:cNvPr id="48" name="Straight Connector 47"/>
+          <p:cNvCxnSpPr/>
+          <p:nvPr/>
+        </p:nvCxnSpPr>
+        <p:spPr>
+          <a:xfrm flipV="1">
+            <a:off x="4407203" y="1422948"/>
+            <a:ext cx="0" cy="216024"/>
+          </a:xfrm>
+          <a:prstGeom prst="line">
+            <a:avLst/>
+          </a:prstGeom>
+          <a:effectLst/>
+        </p:spPr>
+        <p:style>
+          <a:lnRef idx="2">
+            <a:schemeClr val="accent2"/>
+          </a:lnRef>
+          <a:fillRef idx="0">
+            <a:schemeClr val="accent2"/>
+          </a:fillRef>
+          <a:effectRef idx="1">
+            <a:schemeClr val="accent2"/>
+          </a:effectRef>
+          <a:fontRef idx="minor">
+            <a:schemeClr val="tx1"/>
+          </a:fontRef>
+        </p:style>
+      </p:cxnSp>
+      <p:cxnSp>
+        <p:nvCxnSpPr>
+          <p:cNvPr id="49" name="Straight Connector 48"/>
+          <p:cNvCxnSpPr/>
+          <p:nvPr/>
+        </p:nvCxnSpPr>
+        <p:spPr>
+          <a:xfrm flipV="1">
+            <a:off x="5226999" y="1418759"/>
+            <a:ext cx="0" cy="216024"/>
+          </a:xfrm>
+          <a:prstGeom prst="line">
+            <a:avLst/>
+          </a:prstGeom>
+          <a:effectLst/>
+        </p:spPr>
+        <p:style>
+          <a:lnRef idx="2">
+            <a:schemeClr val="accent2"/>
+          </a:lnRef>
+          <a:fillRef idx="0">
+            <a:schemeClr val="accent2"/>
+          </a:fillRef>
+          <a:effectRef idx="1">
+            <a:schemeClr val="accent2"/>
+          </a:effectRef>
+          <a:fontRef idx="minor">
+            <a:schemeClr val="tx1"/>
+          </a:fontRef>
+        </p:style>
+      </p:cxnSp>
+      <p:sp>
+        <p:nvSpPr>
+          <p:cNvPr id="59" name="TextBox 58"/>
+          <p:cNvSpPr txBox="1"/>
+          <p:nvPr/>
+        </p:nvSpPr>
+        <p:spPr>
+          <a:xfrm>
+            <a:off x="4191179" y="1052736"/>
+            <a:ext cx="432048" cy="369332"/>
+          </a:xfrm>
+          <a:prstGeom prst="rect">
+            <a:avLst/>
+          </a:prstGeom>
+          <a:noFill/>
+        </p:spPr>
+        <p:txBody>
+          <a:bodyPr wrap="square" rtlCol="0">
+            <a:spAutoFit/>
+          </a:bodyPr>
+          <a:lstStyle/>
+          <a:p>
+            <a:pPr algn="ctr"/>
+            <a:r>
+              <a:rPr lang="en-US" i="1" dirty="0" smtClean="0"/>
+              <a:t>p</a:t>
+            </a:r>
+            <a:r>
+              <a:rPr lang="en-US" i="1" baseline="-25000" dirty="0" smtClean="0"/>
+              <a:t>1</a:t>
+            </a:r>
+            <a:endParaRPr lang="en-GB" i="1" baseline="-25000" dirty="0"/>
+          </a:p>
+        </p:txBody>
+      </p:sp>
+      <p:sp>
+        <p:nvSpPr>
+          <p:cNvPr id="61" name="TextBox 60"/>
+          <p:cNvSpPr txBox="1"/>
+          <p:nvPr/>
+        </p:nvSpPr>
+        <p:spPr>
+          <a:xfrm>
+            <a:off x="5017902" y="1053007"/>
+            <a:ext cx="432048" cy="369332"/>
+          </a:xfrm>
+          <a:prstGeom prst="rect">
+            <a:avLst/>
+          </a:prstGeom>
+          <a:noFill/>
+        </p:spPr>
+        <p:txBody>
+          <a:bodyPr wrap="square" rtlCol="0">
+            <a:spAutoFit/>
+          </a:bodyPr>
+          <a:lstStyle/>
+          <a:p>
+            <a:pPr algn="ctr"/>
+            <a:r>
+              <a:rPr lang="en-US" i="1" dirty="0" smtClean="0"/>
+              <a:t>p</a:t>
+            </a:r>
+            <a:r>
+              <a:rPr lang="en-US" i="1" baseline="-25000" dirty="0" smtClean="0"/>
+              <a:t>2</a:t>
+            </a:r>
+            <a:endParaRPr lang="en-GB" i="1" baseline="-25000" dirty="0"/>
+          </a:p>
+        </p:txBody>
+      </p:sp>
+      <p:sp>
+        <p:nvSpPr>
+          <p:cNvPr id="72" name="TextBox 71"/>
+          <p:cNvSpPr txBox="1"/>
+          <p:nvPr/>
+        </p:nvSpPr>
+        <p:spPr>
+          <a:xfrm>
+            <a:off x="3426210" y="1110715"/>
+            <a:ext cx="417126" cy="253916"/>
+          </a:xfrm>
+          <a:prstGeom prst="rect">
+            <a:avLst/>
+          </a:prstGeom>
+          <a:noFill/>
+        </p:spPr>
+        <p:txBody>
+          <a:bodyPr wrap="square" rtlCol="0">
+            <a:spAutoFit/>
+          </a:bodyPr>
+          <a:lstStyle/>
+          <a:p>
+            <a:r>
+              <a:rPr lang="en-US" sz="1050" i="1" dirty="0" smtClean="0"/>
+              <a:t>max</a:t>
+            </a:r>
+            <a:endParaRPr lang="en-GB" sz="1050" i="1" dirty="0"/>
+          </a:p>
+        </p:txBody>
+      </p:sp>
+      <p:cxnSp>
+        <p:nvCxnSpPr>
+          <p:cNvPr id="29" name="Straight Connector 28"/>
+          <p:cNvCxnSpPr/>
+          <p:nvPr/>
+        </p:nvCxnSpPr>
+        <p:spPr>
+          <a:xfrm>
+            <a:off x="2627784" y="2097296"/>
+            <a:ext cx="3946586" cy="0"/>
+          </a:xfrm>
+          <a:prstGeom prst="line">
+            <a:avLst/>
+          </a:prstGeom>
+        </p:spPr>
+        <p:style>
+          <a:lnRef idx="1">
+            <a:schemeClr val="dk1"/>
+          </a:lnRef>
+          <a:fillRef idx="0">
+            <a:schemeClr val="dk1"/>
+          </a:fillRef>
+          <a:effectRef idx="0">
+            <a:schemeClr val="dk1"/>
+          </a:effectRef>
+          <a:fontRef idx="minor">
+            <a:schemeClr val="tx1"/>
+          </a:fontRef>
+        </p:style>
+      </p:cxnSp>
+      <p:cxnSp>
+        <p:nvCxnSpPr>
+          <p:cNvPr id="33" name="Straight Connector 32"/>
+          <p:cNvCxnSpPr/>
+          <p:nvPr/>
+        </p:nvCxnSpPr>
+        <p:spPr>
+          <a:xfrm flipV="1">
+            <a:off x="3062227" y="1988840"/>
+            <a:ext cx="0" cy="216024"/>
+          </a:xfrm>
+          <a:prstGeom prst="line">
+            <a:avLst/>
+          </a:prstGeom>
+          <a:ln>
+            <a:solidFill>
+              <a:schemeClr val="accent1"/>
+            </a:solidFill>
+          </a:ln>
+          <a:effectLst/>
+        </p:spPr>
+        <p:style>
+          <a:lnRef idx="2">
+            <a:schemeClr val="accent5"/>
+          </a:lnRef>
+          <a:fillRef idx="0">
+            <a:schemeClr val="accent5"/>
+          </a:fillRef>
+          <a:effectRef idx="1">
+            <a:schemeClr val="accent5"/>
+          </a:effectRef>
+          <a:fontRef idx="minor">
+            <a:schemeClr val="tx1"/>
+          </a:fontRef>
+        </p:style>
+      </p:cxnSp>
+      <p:cxnSp>
+        <p:nvCxnSpPr>
+          <p:cNvPr id="36" name="Straight Connector 35"/>
+          <p:cNvCxnSpPr/>
+          <p:nvPr/>
+        </p:nvCxnSpPr>
+        <p:spPr>
+          <a:xfrm flipV="1">
+            <a:off x="4405365" y="1987915"/>
+            <a:ext cx="0" cy="216024"/>
+          </a:xfrm>
+          <a:prstGeom prst="line">
+            <a:avLst/>
+          </a:prstGeom>
+          <a:effectLst/>
+        </p:spPr>
+        <p:style>
+          <a:lnRef idx="2">
+            <a:schemeClr val="accent2"/>
+          </a:lnRef>
+          <a:fillRef idx="0">
+            <a:schemeClr val="accent2"/>
+          </a:fillRef>
+          <a:effectRef idx="1">
+            <a:schemeClr val="accent2"/>
+          </a:effectRef>
+          <a:fontRef idx="minor">
+            <a:schemeClr val="tx1"/>
+          </a:fontRef>
+        </p:style>
+      </p:cxnSp>
+      <p:cxnSp>
+        <p:nvCxnSpPr>
+          <p:cNvPr id="38" name="Straight Connector 37"/>
+          <p:cNvCxnSpPr/>
+          <p:nvPr/>
+        </p:nvCxnSpPr>
+        <p:spPr>
+          <a:xfrm flipV="1">
+            <a:off x="5229394" y="1983726"/>
+            <a:ext cx="0" cy="216024"/>
+          </a:xfrm>
+          <a:prstGeom prst="line">
+            <a:avLst/>
+          </a:prstGeom>
+          <a:ln>
+            <a:solidFill>
+              <a:schemeClr val="accent1"/>
+            </a:solidFill>
+          </a:ln>
+          <a:effectLst/>
+        </p:spPr>
+        <p:style>
+          <a:lnRef idx="2">
+            <a:schemeClr val="accent2"/>
+          </a:lnRef>
+          <a:fillRef idx="0">
+            <a:schemeClr val="accent2"/>
+          </a:fillRef>
+          <a:effectRef idx="1">
+            <a:schemeClr val="accent2"/>
+          </a:effectRef>
+          <a:fontRef idx="minor">
+            <a:schemeClr val="tx1"/>
+          </a:fontRef>
+        </p:style>
+      </p:cxnSp>
+      <p:cxnSp>
+        <p:nvCxnSpPr>
+          <p:cNvPr id="39" name="Straight Connector 38"/>
+          <p:cNvCxnSpPr/>
+          <p:nvPr/>
+        </p:nvCxnSpPr>
+        <p:spPr>
+          <a:xfrm>
+            <a:off x="2627506" y="2664941"/>
+            <a:ext cx="2606420" cy="1048"/>
+          </a:xfrm>
+          <a:prstGeom prst="line">
+            <a:avLst/>
+          </a:prstGeom>
+        </p:spPr>
+        <p:style>
+          <a:lnRef idx="1">
+            <a:schemeClr val="dk1"/>
+          </a:lnRef>
+          <a:fillRef idx="0">
+            <a:schemeClr val="dk1"/>
+          </a:fillRef>
+          <a:effectRef idx="0">
+            <a:schemeClr val="dk1"/>
+          </a:effectRef>
+          <a:fontRef idx="minor">
+            <a:schemeClr val="tx1"/>
+          </a:fontRef>
+        </p:style>
+      </p:cxnSp>
+      <p:cxnSp>
+        <p:nvCxnSpPr>
+          <p:cNvPr id="40" name="Straight Connector 39"/>
+          <p:cNvCxnSpPr/>
+          <p:nvPr/>
+        </p:nvCxnSpPr>
+        <p:spPr>
+          <a:xfrm flipV="1">
+            <a:off x="3061949" y="2556485"/>
+            <a:ext cx="0" cy="216024"/>
+          </a:xfrm>
+          <a:prstGeom prst="line">
+            <a:avLst/>
+          </a:prstGeom>
+          <a:ln>
+            <a:solidFill>
+              <a:schemeClr val="accent1"/>
+            </a:solidFill>
+          </a:ln>
+          <a:effectLst/>
+        </p:spPr>
+        <p:style>
+          <a:lnRef idx="2">
+            <a:schemeClr val="accent5"/>
+          </a:lnRef>
+          <a:fillRef idx="0">
+            <a:schemeClr val="accent5"/>
+          </a:fillRef>
+          <a:effectRef idx="1">
+            <a:schemeClr val="accent5"/>
+          </a:effectRef>
+          <a:fontRef idx="minor">
+            <a:schemeClr val="tx1"/>
+          </a:fontRef>
+        </p:style>
+      </p:cxnSp>
+      <p:cxnSp>
+        <p:nvCxnSpPr>
+          <p:cNvPr id="43" name="Straight Connector 42"/>
+          <p:cNvCxnSpPr/>
+          <p:nvPr/>
+        </p:nvCxnSpPr>
+        <p:spPr>
+          <a:xfrm flipV="1">
+            <a:off x="4405087" y="2555560"/>
+            <a:ext cx="0" cy="216024"/>
+          </a:xfrm>
+          <a:prstGeom prst="line">
+            <a:avLst/>
+          </a:prstGeom>
+          <a:ln>
+            <a:solidFill>
+              <a:schemeClr val="accent1"/>
+            </a:solidFill>
+          </a:ln>
+          <a:effectLst/>
+        </p:spPr>
+        <p:style>
+          <a:lnRef idx="2">
+            <a:schemeClr val="accent2"/>
+          </a:lnRef>
+          <a:fillRef idx="0">
+            <a:schemeClr val="accent2"/>
+          </a:fillRef>
+          <a:effectRef idx="1">
+            <a:schemeClr val="accent2"/>
+          </a:effectRef>
+          <a:fontRef idx="minor">
+            <a:schemeClr val="tx1"/>
+          </a:fontRef>
+        </p:style>
+      </p:cxnSp>
+      <p:cxnSp>
+        <p:nvCxnSpPr>
+          <p:cNvPr id="44" name="Straight Connector 43"/>
+          <p:cNvCxnSpPr/>
+          <p:nvPr/>
+        </p:nvCxnSpPr>
+        <p:spPr>
+          <a:xfrm flipV="1">
+            <a:off x="3894277" y="2557977"/>
+            <a:ext cx="0" cy="216024"/>
+          </a:xfrm>
+          <a:prstGeom prst="line">
+            <a:avLst/>
+          </a:prstGeom>
+          <a:effectLst/>
+        </p:spPr>
+        <p:style>
+          <a:lnRef idx="2">
+            <a:schemeClr val="accent2"/>
+          </a:lnRef>
+          <a:fillRef idx="0">
+            <a:schemeClr val="accent2"/>
+          </a:fillRef>
+          <a:effectRef idx="1">
+            <a:schemeClr val="accent2"/>
+          </a:effectRef>
+          <a:fontRef idx="minor">
+            <a:schemeClr val="tx1"/>
+          </a:fontRef>
+        </p:style>
+      </p:cxnSp>
+      <p:cxnSp>
+        <p:nvCxnSpPr>
+          <p:cNvPr id="54" name="Straight Connector 53"/>
+          <p:cNvCxnSpPr/>
+          <p:nvPr/>
+        </p:nvCxnSpPr>
+        <p:spPr>
+          <a:xfrm flipV="1">
+            <a:off x="3896220" y="1988840"/>
+            <a:ext cx="0" cy="216024"/>
+          </a:xfrm>
+          <a:prstGeom prst="line">
+            <a:avLst/>
+          </a:prstGeom>
+          <a:effectLst/>
+        </p:spPr>
+        <p:style>
+          <a:lnRef idx="2">
+            <a:schemeClr val="accent2"/>
+          </a:lnRef>
+          <a:fillRef idx="0">
+            <a:schemeClr val="accent2"/>
+          </a:fillRef>
+          <a:effectRef idx="1">
+            <a:schemeClr val="accent2"/>
+          </a:effectRef>
+          <a:fontRef idx="minor">
+            <a:schemeClr val="tx1"/>
+          </a:fontRef>
+        </p:style>
+      </p:cxnSp>
+      <p:sp>
+        <p:nvSpPr>
+          <p:cNvPr id="56" name="Rectangle 55"/>
+          <p:cNvSpPr/>
+          <p:nvPr/>
+        </p:nvSpPr>
+        <p:spPr>
+          <a:xfrm>
+            <a:off x="5081767" y="1649361"/>
+            <a:ext cx="290464" cy="338554"/>
+          </a:xfrm>
+          <a:prstGeom prst="rect">
+            <a:avLst/>
+          </a:prstGeom>
+        </p:spPr>
+        <p:txBody>
+          <a:bodyPr wrap="none">
+            <a:spAutoFit/>
+          </a:bodyPr>
+          <a:lstStyle/>
+          <a:p>
+            <a:pPr algn="ctr"/>
+            <a:r>
+              <a:rPr lang="en-US" sz="1600" i="1" dirty="0"/>
+              <a:t>b</a:t>
+            </a:r>
+            <a:endParaRPr lang="en-GB" sz="1600" i="1" dirty="0"/>
+          </a:p>
+        </p:txBody>
+      </p:sp>
+      <p:sp>
+        <p:nvSpPr>
+          <p:cNvPr id="57" name="TextBox 56"/>
+          <p:cNvSpPr txBox="1"/>
+          <p:nvPr/>
+        </p:nvSpPr>
+        <p:spPr>
+          <a:xfrm>
+            <a:off x="3680196" y="1650286"/>
+            <a:ext cx="432048" cy="338554"/>
+          </a:xfrm>
+          <a:prstGeom prst="rect">
+            <a:avLst/>
+          </a:prstGeom>
+          <a:noFill/>
+        </p:spPr>
+        <p:txBody>
+          <a:bodyPr wrap="square" rtlCol="0">
+            <a:spAutoFit/>
+          </a:bodyPr>
+          <a:lstStyle/>
+          <a:p>
+            <a:pPr algn="ctr"/>
+            <a:r>
+              <a:rPr lang="en-US" sz="1600" i="1" dirty="0" smtClean="0"/>
+              <a:t>p</a:t>
+            </a:r>
+            <a:r>
+              <a:rPr lang="en-US" sz="1600" i="1" baseline="-25000" dirty="0" smtClean="0"/>
+              <a:t>1</a:t>
+            </a:r>
+            <a:endParaRPr lang="en-GB" sz="1600" i="1" baseline="-25000" dirty="0"/>
+          </a:p>
+        </p:txBody>
+      </p:sp>
+      <p:sp>
+        <p:nvSpPr>
+          <p:cNvPr id="58" name="TextBox 57"/>
+          <p:cNvSpPr txBox="1"/>
+          <p:nvPr/>
+        </p:nvSpPr>
+        <p:spPr>
+          <a:xfrm>
+            <a:off x="4189063" y="1649361"/>
+            <a:ext cx="432048" cy="338554"/>
+          </a:xfrm>
+          <a:prstGeom prst="rect">
+            <a:avLst/>
+          </a:prstGeom>
+          <a:noFill/>
+        </p:spPr>
+        <p:txBody>
+          <a:bodyPr wrap="square" rtlCol="0">
+            <a:spAutoFit/>
+          </a:bodyPr>
+          <a:lstStyle/>
+          <a:p>
+            <a:pPr algn="ctr"/>
+            <a:r>
+              <a:rPr lang="en-US" sz="1600" i="1" dirty="0" smtClean="0"/>
+              <a:t>p</a:t>
+            </a:r>
+            <a:r>
+              <a:rPr lang="en-US" sz="1600" i="1" baseline="-25000" dirty="0" smtClean="0"/>
+              <a:t>2</a:t>
+            </a:r>
+            <a:endParaRPr lang="en-GB" sz="1600" i="1" baseline="-25000" dirty="0"/>
+          </a:p>
+        </p:txBody>
+      </p:sp>
+      <p:sp>
+        <p:nvSpPr>
+          <p:cNvPr id="60" name="TextBox 59"/>
+          <p:cNvSpPr txBox="1"/>
+          <p:nvPr/>
+        </p:nvSpPr>
+        <p:spPr>
+          <a:xfrm>
+            <a:off x="2950875" y="1650956"/>
+            <a:ext cx="216024" cy="338554"/>
+          </a:xfrm>
+          <a:prstGeom prst="rect">
+            <a:avLst/>
+          </a:prstGeom>
+          <a:noFill/>
+        </p:spPr>
+        <p:txBody>
+          <a:bodyPr wrap="square" rtlCol="0">
+            <a:spAutoFit/>
+          </a:bodyPr>
+          <a:lstStyle/>
+          <a:p>
+            <a:pPr algn="ctr"/>
+            <a:r>
+              <a:rPr lang="en-US" sz="1600" i="1" dirty="0" smtClean="0"/>
+              <a:t>a</a:t>
+            </a:r>
+            <a:endParaRPr lang="en-GB" sz="1600" i="1" dirty="0"/>
+          </a:p>
+        </p:txBody>
+      </p:sp>
+      <p:cxnSp>
+        <p:nvCxnSpPr>
+          <p:cNvPr id="62" name="Straight Connector 61"/>
+          <p:cNvCxnSpPr/>
+          <p:nvPr/>
+        </p:nvCxnSpPr>
+        <p:spPr>
+          <a:xfrm flipV="1">
+            <a:off x="3570815" y="2557977"/>
+            <a:ext cx="0" cy="216024"/>
+          </a:xfrm>
+          <a:prstGeom prst="line">
+            <a:avLst/>
+          </a:prstGeom>
+          <a:ln/>
+          <a:effectLst/>
+        </p:spPr>
+        <p:style>
+          <a:lnRef idx="2">
+            <a:schemeClr val="accent2"/>
+          </a:lnRef>
+          <a:fillRef idx="0">
+            <a:schemeClr val="accent2"/>
+          </a:fillRef>
+          <a:effectRef idx="1">
+            <a:schemeClr val="accent2"/>
+          </a:effectRef>
+          <a:fontRef idx="minor">
+            <a:schemeClr val="tx1"/>
+          </a:fontRef>
+        </p:style>
+      </p:cxnSp>
+      <p:sp>
+        <p:nvSpPr>
+          <p:cNvPr id="63" name="Rectangle 62"/>
+          <p:cNvSpPr/>
+          <p:nvPr/>
+        </p:nvSpPr>
+        <p:spPr>
+          <a:xfrm>
+            <a:off x="4259855" y="2230539"/>
+            <a:ext cx="290464" cy="338554"/>
+          </a:xfrm>
+          <a:prstGeom prst="rect">
+            <a:avLst/>
+          </a:prstGeom>
+        </p:spPr>
+        <p:txBody>
+          <a:bodyPr wrap="none">
+            <a:spAutoFit/>
+          </a:bodyPr>
+          <a:lstStyle/>
+          <a:p>
+            <a:pPr algn="ctr"/>
+            <a:r>
+              <a:rPr lang="en-US" sz="1600" i="1" dirty="0"/>
+              <a:t>b</a:t>
+            </a:r>
+            <a:endParaRPr lang="en-GB" sz="1600" i="1" dirty="0"/>
+          </a:p>
+        </p:txBody>
+      </p:sp>
+      <p:sp>
+        <p:nvSpPr>
+          <p:cNvPr id="65" name="TextBox 64"/>
+          <p:cNvSpPr txBox="1"/>
+          <p:nvPr/>
+        </p:nvSpPr>
+        <p:spPr>
+          <a:xfrm>
+            <a:off x="3680196" y="2231209"/>
+            <a:ext cx="432048" cy="338554"/>
+          </a:xfrm>
+          <a:prstGeom prst="rect">
+            <a:avLst/>
+          </a:prstGeom>
+          <a:noFill/>
+        </p:spPr>
+        <p:txBody>
+          <a:bodyPr wrap="square" rtlCol="0">
+            <a:spAutoFit/>
+          </a:bodyPr>
+          <a:lstStyle/>
+          <a:p>
+            <a:pPr algn="ctr"/>
+            <a:r>
+              <a:rPr lang="en-US" sz="1600" i="1" dirty="0" smtClean="0"/>
+              <a:t>p</a:t>
+            </a:r>
+            <a:r>
+              <a:rPr lang="en-US" sz="1600" i="1" baseline="-25000" dirty="0" smtClean="0"/>
+              <a:t>2</a:t>
+            </a:r>
+            <a:endParaRPr lang="en-GB" sz="1600" i="1" baseline="-25000" dirty="0"/>
+          </a:p>
+        </p:txBody>
+      </p:sp>
+      <p:sp>
+        <p:nvSpPr>
+          <p:cNvPr id="67" name="TextBox 66"/>
+          <p:cNvSpPr txBox="1"/>
+          <p:nvPr/>
+        </p:nvSpPr>
+        <p:spPr>
+          <a:xfrm>
+            <a:off x="3354791" y="2231209"/>
+            <a:ext cx="432048" cy="338554"/>
+          </a:xfrm>
+          <a:prstGeom prst="rect">
+            <a:avLst/>
+          </a:prstGeom>
+          <a:noFill/>
+        </p:spPr>
+        <p:txBody>
+          <a:bodyPr wrap="square" rtlCol="0">
+            <a:spAutoFit/>
+          </a:bodyPr>
+          <a:lstStyle/>
+          <a:p>
+            <a:pPr algn="ctr"/>
+            <a:r>
+              <a:rPr lang="en-US" sz="1600" i="1" dirty="0" smtClean="0"/>
+              <a:t>p</a:t>
+            </a:r>
+            <a:r>
+              <a:rPr lang="en-US" sz="1600" i="1" baseline="-25000" dirty="0" smtClean="0"/>
+              <a:t>1</a:t>
+            </a:r>
+            <a:endParaRPr lang="en-GB" sz="1600" i="1" baseline="-25000" dirty="0"/>
+          </a:p>
+        </p:txBody>
+      </p:sp>
+      <p:sp>
+        <p:nvSpPr>
+          <p:cNvPr id="68" name="TextBox 67"/>
+          <p:cNvSpPr txBox="1"/>
+          <p:nvPr/>
+        </p:nvSpPr>
+        <p:spPr>
+          <a:xfrm>
+            <a:off x="2950875" y="2231209"/>
+            <a:ext cx="216024" cy="338554"/>
+          </a:xfrm>
+          <a:prstGeom prst="rect">
+            <a:avLst/>
+          </a:prstGeom>
+          <a:noFill/>
+        </p:spPr>
+        <p:txBody>
+          <a:bodyPr wrap="square" rtlCol="0">
+            <a:spAutoFit/>
+          </a:bodyPr>
+          <a:lstStyle/>
+          <a:p>
+            <a:pPr algn="ctr"/>
+            <a:r>
+              <a:rPr lang="en-US" sz="1600" i="1" dirty="0" smtClean="0"/>
+              <a:t>a</a:t>
+            </a:r>
+            <a:endParaRPr lang="en-GB" sz="1600" i="1" dirty="0"/>
+          </a:p>
+        </p:txBody>
+      </p:sp>
+      <p:cxnSp>
+        <p:nvCxnSpPr>
+          <p:cNvPr id="71" name="Straight Connector 70"/>
+          <p:cNvCxnSpPr/>
+          <p:nvPr/>
+        </p:nvCxnSpPr>
+        <p:spPr>
+          <a:xfrm flipV="1">
+            <a:off x="2625389" y="3219459"/>
+            <a:ext cx="1782391" cy="444"/>
+          </a:xfrm>
+          <a:prstGeom prst="line">
+            <a:avLst/>
+          </a:prstGeom>
+        </p:spPr>
+        <p:style>
+          <a:lnRef idx="1">
+            <a:schemeClr val="dk1"/>
+          </a:lnRef>
+          <a:fillRef idx="0">
+            <a:schemeClr val="dk1"/>
+          </a:fillRef>
+          <a:effectRef idx="0">
+            <a:schemeClr val="dk1"/>
+          </a:effectRef>
+          <a:fontRef idx="minor">
+            <a:schemeClr val="tx1"/>
+          </a:fontRef>
+        </p:style>
+      </p:cxnSp>
+      <p:cxnSp>
+        <p:nvCxnSpPr>
+          <p:cNvPr id="73" name="Straight Connector 72"/>
+          <p:cNvCxnSpPr/>
+          <p:nvPr/>
+        </p:nvCxnSpPr>
+        <p:spPr>
+          <a:xfrm flipV="1">
+            <a:off x="3059832" y="3111447"/>
+            <a:ext cx="0" cy="216024"/>
+          </a:xfrm>
+          <a:prstGeom prst="line">
+            <a:avLst/>
+          </a:prstGeom>
+          <a:ln>
+            <a:solidFill>
+              <a:schemeClr val="accent1"/>
+            </a:solidFill>
+          </a:ln>
+          <a:effectLst/>
+        </p:spPr>
+        <p:style>
+          <a:lnRef idx="2">
+            <a:schemeClr val="accent5"/>
+          </a:lnRef>
+          <a:fillRef idx="0">
+            <a:schemeClr val="accent5"/>
+          </a:fillRef>
+          <a:effectRef idx="1">
+            <a:schemeClr val="accent5"/>
+          </a:effectRef>
+          <a:fontRef idx="minor">
+            <a:schemeClr val="tx1"/>
+          </a:fontRef>
+        </p:style>
+      </p:cxnSp>
+      <p:cxnSp>
+        <p:nvCxnSpPr>
+          <p:cNvPr id="77" name="Straight Connector 76"/>
+          <p:cNvCxnSpPr/>
+          <p:nvPr/>
+        </p:nvCxnSpPr>
+        <p:spPr>
+          <a:xfrm flipV="1">
+            <a:off x="3385237" y="3113566"/>
+            <a:ext cx="0" cy="216024"/>
+          </a:xfrm>
+          <a:prstGeom prst="line">
+            <a:avLst/>
+          </a:prstGeom>
+          <a:ln/>
+          <a:effectLst/>
+        </p:spPr>
+        <p:style>
+          <a:lnRef idx="2">
+            <a:schemeClr val="accent2"/>
+          </a:lnRef>
+          <a:fillRef idx="0">
+            <a:schemeClr val="accent2"/>
+          </a:fillRef>
+          <a:effectRef idx="1">
+            <a:schemeClr val="accent2"/>
+          </a:effectRef>
+          <a:fontRef idx="minor">
+            <a:schemeClr val="tx1"/>
+          </a:fontRef>
+        </p:style>
+      </p:cxnSp>
+      <p:cxnSp>
+        <p:nvCxnSpPr>
+          <p:cNvPr id="78" name="Straight Connector 77"/>
+          <p:cNvCxnSpPr/>
+          <p:nvPr/>
+        </p:nvCxnSpPr>
+        <p:spPr>
+          <a:xfrm flipV="1">
+            <a:off x="3892160" y="3112939"/>
+            <a:ext cx="0" cy="216024"/>
+          </a:xfrm>
+          <a:prstGeom prst="line">
+            <a:avLst/>
+          </a:prstGeom>
+          <a:ln>
+            <a:solidFill>
+              <a:schemeClr val="accent1"/>
+            </a:solidFill>
+          </a:ln>
+          <a:effectLst/>
+        </p:spPr>
+        <p:style>
+          <a:lnRef idx="2">
+            <a:schemeClr val="accent2"/>
+          </a:lnRef>
+          <a:fillRef idx="0">
+            <a:schemeClr val="accent2"/>
+          </a:fillRef>
+          <a:effectRef idx="1">
+            <a:schemeClr val="accent2"/>
+          </a:effectRef>
+          <a:fontRef idx="minor">
+            <a:schemeClr val="tx1"/>
+          </a:fontRef>
+        </p:style>
+      </p:cxnSp>
+      <p:cxnSp>
+        <p:nvCxnSpPr>
+          <p:cNvPr id="79" name="Straight Connector 78"/>
+          <p:cNvCxnSpPr/>
+          <p:nvPr/>
+        </p:nvCxnSpPr>
+        <p:spPr>
+          <a:xfrm flipV="1">
+            <a:off x="3568698" y="3112939"/>
+            <a:ext cx="0" cy="216024"/>
+          </a:xfrm>
+          <a:prstGeom prst="line">
+            <a:avLst/>
+          </a:prstGeom>
+          <a:ln/>
+          <a:effectLst/>
+        </p:spPr>
+        <p:style>
+          <a:lnRef idx="2">
+            <a:schemeClr val="accent2"/>
+          </a:lnRef>
+          <a:fillRef idx="0">
+            <a:schemeClr val="accent2"/>
+          </a:fillRef>
+          <a:effectRef idx="1">
+            <a:schemeClr val="accent2"/>
+          </a:effectRef>
+          <a:fontRef idx="minor">
+            <a:schemeClr val="tx1"/>
+          </a:fontRef>
+        </p:style>
+      </p:cxnSp>
+      <p:sp>
+        <p:nvSpPr>
+          <p:cNvPr id="80" name="TextBox 79"/>
+          <p:cNvSpPr txBox="1"/>
+          <p:nvPr/>
+        </p:nvSpPr>
+        <p:spPr>
+          <a:xfrm>
+            <a:off x="2958938" y="2775012"/>
+            <a:ext cx="216024" cy="338554"/>
+          </a:xfrm>
+          <a:prstGeom prst="rect">
+            <a:avLst/>
+          </a:prstGeom>
+          <a:noFill/>
+        </p:spPr>
+        <p:txBody>
+          <a:bodyPr wrap="square" rtlCol="0">
+            <a:spAutoFit/>
+          </a:bodyPr>
+          <a:lstStyle/>
+          <a:p>
+            <a:pPr algn="ctr"/>
+            <a:r>
+              <a:rPr lang="en-US" sz="1600" i="1" dirty="0" smtClean="0"/>
+              <a:t>a</a:t>
+            </a:r>
+            <a:endParaRPr lang="en-GB" sz="1600" i="1" dirty="0"/>
+          </a:p>
+        </p:txBody>
+      </p:sp>
+      <p:sp>
+        <p:nvSpPr>
+          <p:cNvPr id="81" name="Rectangle 80"/>
+          <p:cNvSpPr/>
+          <p:nvPr/>
+        </p:nvSpPr>
+        <p:spPr>
+          <a:xfrm>
+            <a:off x="3750988" y="2784719"/>
+            <a:ext cx="290464" cy="338554"/>
+          </a:xfrm>
+          <a:prstGeom prst="rect">
+            <a:avLst/>
+          </a:prstGeom>
+        </p:spPr>
+        <p:txBody>
+          <a:bodyPr wrap="none">
+            <a:spAutoFit/>
+          </a:bodyPr>
+          <a:lstStyle/>
+          <a:p>
+            <a:pPr algn="ctr"/>
+            <a:r>
+              <a:rPr lang="en-US" sz="1600" i="1" dirty="0"/>
+              <a:t>b</a:t>
+            </a:r>
+            <a:endParaRPr lang="en-GB" sz="1600" i="1" dirty="0"/>
+          </a:p>
+        </p:txBody>
+      </p:sp>
+      <p:cxnSp>
+        <p:nvCxnSpPr>
+          <p:cNvPr id="82" name="Straight Connector 81"/>
+          <p:cNvCxnSpPr/>
+          <p:nvPr/>
+        </p:nvCxnSpPr>
+        <p:spPr>
+          <a:xfrm flipV="1">
+            <a:off x="3634773" y="1426630"/>
+            <a:ext cx="0" cy="216024"/>
+          </a:xfrm>
+          <a:prstGeom prst="line">
+            <a:avLst/>
+          </a:prstGeom>
+          <a:ln/>
+          <a:effectLst/>
+        </p:spPr>
+        <p:style>
+          <a:lnRef idx="2">
+            <a:schemeClr val="accent4"/>
+          </a:lnRef>
+          <a:fillRef idx="0">
+            <a:schemeClr val="accent4"/>
+          </a:fillRef>
+          <a:effectRef idx="1">
+            <a:schemeClr val="accent4"/>
+          </a:effectRef>
+          <a:fontRef idx="minor">
+            <a:schemeClr val="tx1"/>
+          </a:fontRef>
+        </p:style>
+      </p:cxnSp>
+      <p:cxnSp>
+        <p:nvCxnSpPr>
+          <p:cNvPr id="83" name="Straight Connector 82"/>
+          <p:cNvCxnSpPr/>
+          <p:nvPr/>
+        </p:nvCxnSpPr>
+        <p:spPr>
+          <a:xfrm flipH="1" flipV="1">
+            <a:off x="3634773" y="1534642"/>
+            <a:ext cx="1123" cy="2470422"/>
+          </a:xfrm>
+          <a:prstGeom prst="line">
+            <a:avLst/>
+          </a:prstGeom>
+          <a:ln/>
+        </p:spPr>
+        <p:style>
+          <a:lnRef idx="1">
+            <a:schemeClr val="accent4"/>
+          </a:lnRef>
+          <a:fillRef idx="0">
+            <a:schemeClr val="accent4"/>
+          </a:fillRef>
+          <a:effectRef idx="0">
+            <a:schemeClr val="accent4"/>
+          </a:effectRef>
+          <a:fontRef idx="minor">
+            <a:schemeClr val="tx1"/>
+          </a:fontRef>
+        </p:style>
+      </p:cxnSp>
+      <p:sp>
+        <p:nvSpPr>
+          <p:cNvPr id="86" name="TextBox 85"/>
+          <p:cNvSpPr txBox="1"/>
+          <p:nvPr/>
+        </p:nvSpPr>
+        <p:spPr>
+          <a:xfrm>
+            <a:off x="3354791" y="2775012"/>
+            <a:ext cx="432048" cy="338554"/>
+          </a:xfrm>
+          <a:prstGeom prst="rect">
+            <a:avLst/>
+          </a:prstGeom>
+          <a:noFill/>
+        </p:spPr>
+        <p:txBody>
+          <a:bodyPr wrap="square" rtlCol="0">
+            <a:spAutoFit/>
+          </a:bodyPr>
+          <a:lstStyle/>
+          <a:p>
+            <a:pPr algn="ctr"/>
+            <a:r>
+              <a:rPr lang="en-US" sz="1600" i="1" dirty="0" smtClean="0"/>
+              <a:t>p</a:t>
+            </a:r>
+            <a:r>
+              <a:rPr lang="en-US" sz="1600" i="1" baseline="-25000" dirty="0" smtClean="0"/>
+              <a:t>2</a:t>
+            </a:r>
+            <a:endParaRPr lang="en-GB" sz="1600" i="1" baseline="-25000" dirty="0"/>
+          </a:p>
+        </p:txBody>
+      </p:sp>
+      <p:sp>
+        <p:nvSpPr>
+          <p:cNvPr id="87" name="TextBox 86"/>
+          <p:cNvSpPr txBox="1"/>
+          <p:nvPr/>
+        </p:nvSpPr>
+        <p:spPr>
+          <a:xfrm>
+            <a:off x="3157073" y="2774676"/>
+            <a:ext cx="432048" cy="338554"/>
+          </a:xfrm>
+          <a:prstGeom prst="rect">
+            <a:avLst/>
+          </a:prstGeom>
+          <a:noFill/>
+        </p:spPr>
+        <p:txBody>
+          <a:bodyPr wrap="square" rtlCol="0">
+            <a:spAutoFit/>
+          </a:bodyPr>
+          <a:lstStyle/>
+          <a:p>
+            <a:pPr algn="ctr"/>
+            <a:r>
+              <a:rPr lang="en-US" sz="1600" i="1" dirty="0" smtClean="0"/>
+              <a:t>p</a:t>
+            </a:r>
+            <a:r>
+              <a:rPr lang="en-US" sz="1600" i="1" baseline="-25000" dirty="0" smtClean="0"/>
+              <a:t>1</a:t>
+            </a:r>
+            <a:endParaRPr lang="en-GB" sz="1600" i="1" baseline="-25000" dirty="0"/>
+          </a:p>
+        </p:txBody>
+      </p:sp>
+      <p:cxnSp>
+        <p:nvCxnSpPr>
+          <p:cNvPr id="88" name="Straight Connector 87"/>
+          <p:cNvCxnSpPr/>
+          <p:nvPr/>
+        </p:nvCxnSpPr>
+        <p:spPr>
+          <a:xfrm>
+            <a:off x="3058887" y="3782486"/>
+            <a:ext cx="1348893" cy="627"/>
+          </a:xfrm>
+          <a:prstGeom prst="line">
+            <a:avLst/>
+          </a:prstGeom>
+        </p:spPr>
+        <p:style>
+          <a:lnRef idx="1">
+            <a:schemeClr val="dk1"/>
+          </a:lnRef>
+          <a:fillRef idx="0">
+            <a:schemeClr val="dk1"/>
+          </a:fillRef>
+          <a:effectRef idx="0">
+            <a:schemeClr val="dk1"/>
+          </a:effectRef>
+          <a:fontRef idx="minor">
+            <a:schemeClr val="tx1"/>
+          </a:fontRef>
+        </p:style>
+      </p:cxnSp>
+      <p:cxnSp>
+        <p:nvCxnSpPr>
+          <p:cNvPr id="89" name="Straight Connector 88"/>
+          <p:cNvCxnSpPr/>
+          <p:nvPr/>
+        </p:nvCxnSpPr>
+        <p:spPr>
+          <a:xfrm flipV="1">
+            <a:off x="3707904" y="3672982"/>
+            <a:ext cx="0" cy="216024"/>
+          </a:xfrm>
+          <a:prstGeom prst="line">
+            <a:avLst/>
+          </a:prstGeom>
+          <a:ln/>
+          <a:effectLst/>
+        </p:spPr>
+        <p:style>
+          <a:lnRef idx="2">
+            <a:schemeClr val="accent2"/>
+          </a:lnRef>
+          <a:fillRef idx="0">
+            <a:schemeClr val="accent2"/>
+          </a:fillRef>
+          <a:effectRef idx="1">
+            <a:schemeClr val="accent2"/>
+          </a:effectRef>
+          <a:fontRef idx="minor">
+            <a:schemeClr val="tx1"/>
+          </a:fontRef>
+        </p:style>
+      </p:cxnSp>
+      <p:cxnSp>
+        <p:nvCxnSpPr>
+          <p:cNvPr id="90" name="Straight Connector 89"/>
+          <p:cNvCxnSpPr/>
+          <p:nvPr/>
+        </p:nvCxnSpPr>
+        <p:spPr>
+          <a:xfrm flipV="1">
+            <a:off x="3387632" y="3675101"/>
+            <a:ext cx="0" cy="216024"/>
+          </a:xfrm>
+          <a:prstGeom prst="line">
+            <a:avLst/>
+          </a:prstGeom>
+          <a:ln>
+            <a:solidFill>
+              <a:schemeClr val="accent1"/>
+            </a:solidFill>
+          </a:ln>
+          <a:effectLst/>
+        </p:spPr>
+        <p:style>
+          <a:lnRef idx="2">
+            <a:schemeClr val="accent2"/>
+          </a:lnRef>
+          <a:fillRef idx="0">
+            <a:schemeClr val="accent2"/>
+          </a:fillRef>
+          <a:effectRef idx="1">
+            <a:schemeClr val="accent2"/>
+          </a:effectRef>
+          <a:fontRef idx="minor">
+            <a:schemeClr val="tx1"/>
+          </a:fontRef>
+        </p:style>
+      </p:cxnSp>
+      <p:cxnSp>
+        <p:nvCxnSpPr>
+          <p:cNvPr id="91" name="Straight Connector 90"/>
+          <p:cNvCxnSpPr/>
+          <p:nvPr/>
+        </p:nvCxnSpPr>
+        <p:spPr>
+          <a:xfrm flipV="1">
+            <a:off x="3894555" y="3674474"/>
+            <a:ext cx="0" cy="216024"/>
+          </a:xfrm>
+          <a:prstGeom prst="line">
+            <a:avLst/>
+          </a:prstGeom>
+          <a:ln>
+            <a:solidFill>
+              <a:schemeClr val="accent1"/>
+            </a:solidFill>
+          </a:ln>
+          <a:effectLst/>
+        </p:spPr>
+        <p:style>
+          <a:lnRef idx="2">
+            <a:schemeClr val="accent2"/>
+          </a:lnRef>
+          <a:fillRef idx="0">
+            <a:schemeClr val="accent2"/>
+          </a:fillRef>
+          <a:effectRef idx="1">
+            <a:schemeClr val="accent2"/>
+          </a:effectRef>
+          <a:fontRef idx="minor">
+            <a:schemeClr val="tx1"/>
+          </a:fontRef>
+        </p:style>
+      </p:cxnSp>
+      <p:cxnSp>
+        <p:nvCxnSpPr>
+          <p:cNvPr id="92" name="Straight Connector 91"/>
+          <p:cNvCxnSpPr/>
+          <p:nvPr/>
+        </p:nvCxnSpPr>
+        <p:spPr>
+          <a:xfrm flipV="1">
+            <a:off x="3571093" y="3674474"/>
+            <a:ext cx="0" cy="216024"/>
+          </a:xfrm>
+          <a:prstGeom prst="line">
+            <a:avLst/>
+          </a:prstGeom>
+          <a:ln/>
+          <a:effectLst/>
+        </p:spPr>
+        <p:style>
+          <a:lnRef idx="2">
+            <a:schemeClr val="accent2"/>
+          </a:lnRef>
+          <a:fillRef idx="0">
+            <a:schemeClr val="accent2"/>
+          </a:fillRef>
+          <a:effectRef idx="1">
+            <a:schemeClr val="accent2"/>
+          </a:effectRef>
+          <a:fontRef idx="minor">
+            <a:schemeClr val="tx1"/>
+          </a:fontRef>
+        </p:style>
+      </p:cxnSp>
+      <p:sp>
+        <p:nvSpPr>
+          <p:cNvPr id="93" name="TextBox 92"/>
+          <p:cNvSpPr txBox="1"/>
+          <p:nvPr/>
+        </p:nvSpPr>
+        <p:spPr>
+          <a:xfrm>
+            <a:off x="3265085" y="3346254"/>
+            <a:ext cx="216024" cy="307777"/>
+          </a:xfrm>
+          <a:prstGeom prst="rect">
+            <a:avLst/>
+          </a:prstGeom>
+          <a:noFill/>
+        </p:spPr>
+        <p:txBody>
+          <a:bodyPr wrap="square" rtlCol="0">
+            <a:spAutoFit/>
+          </a:bodyPr>
+          <a:lstStyle/>
+          <a:p>
+            <a:pPr algn="ctr"/>
+            <a:r>
+              <a:rPr lang="en-US" sz="1400" i="1" dirty="0" smtClean="0"/>
+              <a:t>a</a:t>
+            </a:r>
+            <a:endParaRPr lang="en-GB" sz="1400" i="1" dirty="0"/>
+          </a:p>
+        </p:txBody>
+      </p:sp>
+      <p:sp>
+        <p:nvSpPr>
+          <p:cNvPr id="94" name="Rectangle 93"/>
+          <p:cNvSpPr/>
+          <p:nvPr/>
+        </p:nvSpPr>
+        <p:spPr>
+          <a:xfrm>
+            <a:off x="3759795" y="3346254"/>
+            <a:ext cx="277640" cy="307777"/>
+          </a:xfrm>
+          <a:prstGeom prst="rect">
+            <a:avLst/>
+          </a:prstGeom>
+        </p:spPr>
+        <p:txBody>
+          <a:bodyPr wrap="none">
+            <a:spAutoFit/>
+          </a:bodyPr>
+          <a:lstStyle/>
+          <a:p>
+            <a:pPr algn="ctr"/>
+            <a:r>
+              <a:rPr lang="en-US" sz="1400" i="1" dirty="0"/>
+              <a:t>b</a:t>
+            </a:r>
+            <a:endParaRPr lang="en-GB" sz="1400" i="1" dirty="0"/>
+          </a:p>
+        </p:txBody>
+      </p:sp>
+      <p:sp>
+        <p:nvSpPr>
+          <p:cNvPr id="95" name="TextBox 94"/>
+          <p:cNvSpPr txBox="1"/>
+          <p:nvPr/>
+        </p:nvSpPr>
+        <p:spPr>
+          <a:xfrm>
+            <a:off x="3535611" y="3346254"/>
+            <a:ext cx="432048" cy="307777"/>
+          </a:xfrm>
+          <a:prstGeom prst="rect">
+            <a:avLst/>
+          </a:prstGeom>
+          <a:noFill/>
+        </p:spPr>
+        <p:txBody>
+          <a:bodyPr wrap="square" rtlCol="0">
+            <a:spAutoFit/>
+          </a:bodyPr>
+          <a:lstStyle/>
+          <a:p>
+            <a:pPr algn="ctr"/>
+            <a:r>
+              <a:rPr lang="en-US" sz="1400" i="1" dirty="0" smtClean="0"/>
+              <a:t>p</a:t>
+            </a:r>
+            <a:r>
+              <a:rPr lang="en-US" sz="1400" i="1" baseline="-25000" dirty="0" smtClean="0"/>
+              <a:t>2</a:t>
+            </a:r>
+            <a:endParaRPr lang="en-GB" sz="1400" i="1" baseline="-25000" dirty="0"/>
+          </a:p>
+        </p:txBody>
+      </p:sp>
+      <p:sp>
+        <p:nvSpPr>
+          <p:cNvPr id="96" name="TextBox 95"/>
+          <p:cNvSpPr txBox="1"/>
+          <p:nvPr/>
+        </p:nvSpPr>
+        <p:spPr>
+          <a:xfrm>
+            <a:off x="3352674" y="3346254"/>
+            <a:ext cx="432048" cy="307777"/>
+          </a:xfrm>
+          <a:prstGeom prst="rect">
+            <a:avLst/>
+          </a:prstGeom>
+          <a:noFill/>
+        </p:spPr>
+        <p:txBody>
+          <a:bodyPr wrap="square" rtlCol="0">
+            <a:spAutoFit/>
+          </a:bodyPr>
+          <a:lstStyle/>
+          <a:p>
+            <a:pPr algn="ctr"/>
+            <a:r>
+              <a:rPr lang="en-US" sz="1400" i="1" dirty="0" smtClean="0"/>
+              <a:t>p</a:t>
+            </a:r>
+            <a:r>
+              <a:rPr lang="en-US" sz="1400" i="1" baseline="-25000" dirty="0" smtClean="0"/>
+              <a:t>1</a:t>
+            </a:r>
+            <a:endParaRPr lang="en-GB" sz="1400" i="1" baseline="-25000" dirty="0"/>
+          </a:p>
+        </p:txBody>
+      </p:sp>
+    </p:spTree>
+    <p:extLst>
+      <p:ext uri="{BB962C8B-B14F-4D97-AF65-F5344CB8AC3E}">
+        <p14:creationId xmlns:p14="http://schemas.microsoft.com/office/powerpoint/2010/main" val="3748784398"/>
+      </p:ext>
+    </p:extLst>
+  </p:cSld>
+  <p:clrMapOvr>
+    <a:masterClrMapping/>
+  </p:clrMapOvr>
+  <p:timing>
+    <p:tnLst>
+      <p:par>
+        <p:cTn id="1" dur="indefinite" restart="never" nodeType="tmRoot"/>
+      </p:par>
+    </p:tnLst>
+  </p:timing>
+</p:sld>
+</file>
+
 <file path=ppt/theme/theme1.xml><?xml version="1.0" encoding="utf-8"?>
 <a:theme xmlns:a="http://schemas.openxmlformats.org/drawingml/2006/main" name="Office Theme">
   <a:themeElements>

</xml_diff>

<commit_message>
22-0102015 9:20 Signed-off-by: cyrexxx <kartik@kth.se>
</commit_message>
<xml_diff>
--- a/pictures_EXjob.pptx
+++ b/pictures_EXjob.pptx
@@ -294,7 +294,7 @@
           <a:p>
             <a:fld id="{BE16429E-4863-48F2-B7AC-2A1E05C3D89A}" type="datetimeFigureOut">
               <a:rPr lang="en-GB" smtClean="0"/>
-              <a:t>15/01/2015</a:t>
+              <a:t>21/01/2015</a:t>
             </a:fld>
             <a:endParaRPr lang="en-GB" dirty="0"/>
           </a:p>
@@ -464,7 +464,7 @@
           <a:p>
             <a:fld id="{BE16429E-4863-48F2-B7AC-2A1E05C3D89A}" type="datetimeFigureOut">
               <a:rPr lang="en-GB" smtClean="0"/>
-              <a:t>15/01/2015</a:t>
+              <a:t>21/01/2015</a:t>
             </a:fld>
             <a:endParaRPr lang="en-GB" dirty="0"/>
           </a:p>
@@ -644,7 +644,7 @@
           <a:p>
             <a:fld id="{BE16429E-4863-48F2-B7AC-2A1E05C3D89A}" type="datetimeFigureOut">
               <a:rPr lang="en-GB" smtClean="0"/>
-              <a:t>15/01/2015</a:t>
+              <a:t>21/01/2015</a:t>
             </a:fld>
             <a:endParaRPr lang="en-GB" dirty="0"/>
           </a:p>
@@ -814,7 +814,7 @@
           <a:p>
             <a:fld id="{BE16429E-4863-48F2-B7AC-2A1E05C3D89A}" type="datetimeFigureOut">
               <a:rPr lang="en-GB" smtClean="0"/>
-              <a:t>15/01/2015</a:t>
+              <a:t>21/01/2015</a:t>
             </a:fld>
             <a:endParaRPr lang="en-GB" dirty="0"/>
           </a:p>
@@ -1060,7 +1060,7 @@
           <a:p>
             <a:fld id="{BE16429E-4863-48F2-B7AC-2A1E05C3D89A}" type="datetimeFigureOut">
               <a:rPr lang="en-GB" smtClean="0"/>
-              <a:t>15/01/2015</a:t>
+              <a:t>21/01/2015</a:t>
             </a:fld>
             <a:endParaRPr lang="en-GB" dirty="0"/>
           </a:p>
@@ -1348,7 +1348,7 @@
           <a:p>
             <a:fld id="{BE16429E-4863-48F2-B7AC-2A1E05C3D89A}" type="datetimeFigureOut">
               <a:rPr lang="en-GB" smtClean="0"/>
-              <a:t>15/01/2015</a:t>
+              <a:t>21/01/2015</a:t>
             </a:fld>
             <a:endParaRPr lang="en-GB" dirty="0"/>
           </a:p>
@@ -1770,7 +1770,7 @@
           <a:p>
             <a:fld id="{BE16429E-4863-48F2-B7AC-2A1E05C3D89A}" type="datetimeFigureOut">
               <a:rPr lang="en-GB" smtClean="0"/>
-              <a:t>15/01/2015</a:t>
+              <a:t>21/01/2015</a:t>
             </a:fld>
             <a:endParaRPr lang="en-GB" dirty="0"/>
           </a:p>
@@ -1888,7 +1888,7 @@
           <a:p>
             <a:fld id="{BE16429E-4863-48F2-B7AC-2A1E05C3D89A}" type="datetimeFigureOut">
               <a:rPr lang="en-GB" smtClean="0"/>
-              <a:t>15/01/2015</a:t>
+              <a:t>21/01/2015</a:t>
             </a:fld>
             <a:endParaRPr lang="en-GB" dirty="0"/>
           </a:p>
@@ -1983,7 +1983,7 @@
           <a:p>
             <a:fld id="{BE16429E-4863-48F2-B7AC-2A1E05C3D89A}" type="datetimeFigureOut">
               <a:rPr lang="en-GB" smtClean="0"/>
-              <a:t>15/01/2015</a:t>
+              <a:t>21/01/2015</a:t>
             </a:fld>
             <a:endParaRPr lang="en-GB" dirty="0"/>
           </a:p>
@@ -2260,7 +2260,7 @@
           <a:p>
             <a:fld id="{BE16429E-4863-48F2-B7AC-2A1E05C3D89A}" type="datetimeFigureOut">
               <a:rPr lang="en-GB" smtClean="0"/>
-              <a:t>15/01/2015</a:t>
+              <a:t>21/01/2015</a:t>
             </a:fld>
             <a:endParaRPr lang="en-GB" dirty="0"/>
           </a:p>
@@ -2513,7 +2513,7 @@
           <a:p>
             <a:fld id="{BE16429E-4863-48F2-B7AC-2A1E05C3D89A}" type="datetimeFigureOut">
               <a:rPr lang="en-GB" smtClean="0"/>
-              <a:t>15/01/2015</a:t>
+              <a:t>21/01/2015</a:t>
             </a:fld>
             <a:endParaRPr lang="en-GB" dirty="0"/>
           </a:p>
@@ -2726,7 +2726,7 @@
           <a:p>
             <a:fld id="{BE16429E-4863-48F2-B7AC-2A1E05C3D89A}" type="datetimeFigureOut">
               <a:rPr lang="en-GB" smtClean="0"/>
-              <a:t>15/01/2015</a:t>
+              <a:t>21/01/2015</a:t>
             </a:fld>
             <a:endParaRPr lang="en-GB" dirty="0"/>
           </a:p>
@@ -19830,6 +19830,11 @@
           <a:prstGeom prst="line">
             <a:avLst/>
           </a:prstGeom>
+          <a:ln>
+            <a:solidFill>
+              <a:schemeClr val="tx1"/>
+            </a:solidFill>
+          </a:ln>
           <a:effectLst/>
         </p:spPr>
         <p:style>
@@ -20003,13 +20008,13 @@
         </p:spPr>
         <p:style>
           <a:lnRef idx="2">
-            <a:schemeClr val="accent2"/>
+            <a:schemeClr val="dk1"/>
           </a:lnRef>
           <a:fillRef idx="0">
-            <a:schemeClr val="accent2"/>
+            <a:schemeClr val="dk1"/>
           </a:fillRef>
           <a:effectRef idx="1">
-            <a:schemeClr val="accent2"/>
+            <a:schemeClr val="dk1"/>
           </a:effectRef>
           <a:fontRef idx="minor">
             <a:schemeClr val="tx1"/>
@@ -20489,7 +20494,11 @@
           <a:prstGeom prst="line">
             <a:avLst/>
           </a:prstGeom>
-          <a:ln/>
+          <a:ln>
+            <a:solidFill>
+              <a:schemeClr val="tx1"/>
+            </a:solidFill>
+          </a:ln>
           <a:effectLst/>
         </p:spPr>
         <p:style>
@@ -20817,7 +20826,11 @@
           <a:prstGeom prst="line">
             <a:avLst/>
           </a:prstGeom>
-          <a:ln/>
+          <a:ln>
+            <a:solidFill>
+              <a:schemeClr val="tx1"/>
+            </a:solidFill>
+          </a:ln>
           <a:effectLst/>
         </p:spPr>
         <p:style>

</xml_diff>